<commit_message>
modify slidereader and create XML documentation
</commit_message>
<xml_diff>
--- a/presentations/naoPPTX.pptx
+++ b/presentations/naoPPTX.pptx
@@ -203,7 +203,7 @@
           <a:p>
             <a:fld id="{AB5941CB-9FBC-4619-9DA1-47A8A513573E}" type="datetimeFigureOut">
               <a:rPr lang="en-US" smtClean="0"/>
-              <a:t>6/29/2021</a:t>
+              <a:t>7/8/2021</a:t>
             </a:fld>
             <a:endParaRPr lang="en-US"/>
           </a:p>
@@ -537,44 +537,25 @@
               </a:rPr>
               <a:t>$event=next </a:t>
             </a:r>
-            <a:endParaRPr lang="en-US" sz="1200" b="0" i="0" kern="1200" dirty="0" smtClean="0">
-              <a:solidFill>
-                <a:schemeClr val="tx1"/>
-              </a:solidFill>
-              <a:effectLst/>
-              <a:latin typeface="+mn-lt"/>
-              <a:ea typeface="+mn-ea"/>
-              <a:cs typeface="+mn-cs"/>
-            </a:endParaRPr>
-          </a:p>
-          <a:p>
-            <a:r>
-              <a:rPr lang="en-US" baseline="0" smtClean="0"/>
-              <a:t>\pau=200\ </a:t>
-            </a:r>
-            <a:r>
-              <a:rPr lang="en-US" sz="1200" b="0" i="0" kern="1200" smtClean="0">
-                <a:solidFill>
-                  <a:schemeClr val="tx1"/>
-                </a:solidFill>
-                <a:effectLst/>
-                <a:latin typeface="+mn-lt"/>
-                <a:ea typeface="+mn-ea"/>
-                <a:cs typeface="+mn-cs"/>
-              </a:rPr>
-              <a:t> </a:t>
-            </a:r>
-            <a:endParaRPr lang="en-US" sz="1200" b="0" i="0" kern="1200" dirty="0" smtClean="0">
-              <a:solidFill>
-                <a:schemeClr val="tx1"/>
-              </a:solidFill>
-              <a:effectLst/>
-              <a:latin typeface="+mn-lt"/>
-              <a:ea typeface="+mn-ea"/>
-              <a:cs typeface="+mn-cs"/>
-            </a:endParaRPr>
-          </a:p>
-          <a:p>
+          </a:p>
+          <a:p>
+            <a:pPr marL="0" marR="0" lvl="0" indent="0" algn="l" defTabSz="914400" rtl="0" eaLnBrk="1" fontAlgn="auto" latinLnBrk="0" hangingPunct="1">
+              <a:lnSpc>
+                <a:spcPct val="100000"/>
+              </a:lnSpc>
+              <a:spcBef>
+                <a:spcPts val="0"/>
+              </a:spcBef>
+              <a:spcAft>
+                <a:spcPts val="0"/>
+              </a:spcAft>
+              <a:buClrTx/>
+              <a:buSzTx/>
+              <a:buFontTx/>
+              <a:buNone/>
+              <a:tabLst/>
+              <a:defRPr/>
+            </a:pPr>
             <a:r>
               <a:rPr lang="en-US" sz="1200" b="0" i="0" kern="1200" dirty="0" smtClean="0">
                 <a:solidFill>
@@ -587,6 +568,68 @@
               </a:rPr>
               <a:t>$event=next </a:t>
             </a:r>
+          </a:p>
+          <a:p>
+            <a:r>
+              <a:rPr lang="en-US" baseline="0" dirty="0" smtClean="0"/>
+              <a:t>\pau=200\ </a:t>
+            </a:r>
+            <a:r>
+              <a:rPr lang="en-US" sz="1200" b="0" i="0" kern="1200" dirty="0" smtClean="0">
+                <a:solidFill>
+                  <a:schemeClr val="tx1"/>
+                </a:solidFill>
+                <a:effectLst/>
+                <a:latin typeface="+mn-lt"/>
+                <a:ea typeface="+mn-ea"/>
+                <a:cs typeface="+mn-cs"/>
+              </a:rPr>
+              <a:t> </a:t>
+            </a:r>
+          </a:p>
+          <a:p>
+            <a:pPr marL="0" marR="0" lvl="0" indent="0" algn="l" defTabSz="914400" rtl="0" eaLnBrk="1" fontAlgn="auto" latinLnBrk="0" hangingPunct="1">
+              <a:lnSpc>
+                <a:spcPct val="100000"/>
+              </a:lnSpc>
+              <a:spcBef>
+                <a:spcPts val="0"/>
+              </a:spcBef>
+              <a:spcAft>
+                <a:spcPts val="0"/>
+              </a:spcAft>
+              <a:buClrTx/>
+              <a:buSzTx/>
+              <a:buFontTx/>
+              <a:buNone/>
+              <a:tabLst/>
+              <a:defRPr/>
+            </a:pPr>
+            <a:r>
+              <a:rPr lang="en-US" sz="1200" b="0" i="0" kern="1200" smtClean="0">
+                <a:solidFill>
+                  <a:schemeClr val="tx1"/>
+                </a:solidFill>
+                <a:effectLst/>
+                <a:latin typeface="+mn-lt"/>
+                <a:ea typeface="+mn-ea"/>
+                <a:cs typeface="+mn-cs"/>
+              </a:rPr>
+              <a:t>$event=</a:t>
+            </a:r>
+            <a:r>
+              <a:rPr lang="en-US" sz="1200" b="0" kern="1200" smtClean="0">
+                <a:solidFill>
+                  <a:schemeClr val="tx1"/>
+                </a:solidFill>
+                <a:effectLst/>
+                <a:latin typeface="+mn-lt"/>
+                <a:ea typeface="+mn-ea"/>
+                <a:cs typeface="+mn-cs"/>
+              </a:rPr>
+              <a:t>crash</a:t>
+            </a:r>
+            <a:endParaRPr lang="ru-RU" baseline="0" dirty="0" smtClean="0"/>
           </a:p>
           <a:p>
             <a:r>
@@ -962,11 +1005,43 @@
             </a:pPr>
             <a:r>
               <a:rPr lang="en-US" dirty="0" smtClean="0"/>
+              <a:t>&lt;set</a:t>
+            </a:r>
+            <a:r>
+              <a:rPr lang="en-US" baseline="0" dirty="0" smtClean="0"/>
+              <a:t> animation-ns=“animations/Stand/Waiting”/&gt;</a:t>
+            </a:r>
+            <a:endParaRPr lang="en-US" dirty="0" smtClean="0"/>
+          </a:p>
+          <a:p>
+            <a:pPr marL="0" marR="0" lvl="0" indent="0" algn="l" defTabSz="914400" rtl="0" eaLnBrk="1" fontAlgn="auto" latinLnBrk="0" hangingPunct="1">
+              <a:lnSpc>
+                <a:spcPct val="100000"/>
+              </a:lnSpc>
+              <a:spcBef>
+                <a:spcPts val="0"/>
+              </a:spcBef>
+              <a:spcAft>
+                <a:spcPts val="0"/>
+              </a:spcAft>
+              <a:buClrTx/>
+              <a:buSzTx/>
+              <a:buFontTx/>
+              <a:buNone/>
+              <a:tabLst/>
+              <a:defRPr/>
+            </a:pPr>
+            <a:r>
+              <a:rPr lang="en-US" dirty="0" smtClean="0"/>
               <a:t>A</a:t>
             </a:r>
             <a:r>
               <a:rPr lang="en-US" baseline="0" dirty="0" smtClean="0"/>
-              <a:t> lot of motors \pau=100\ sensors \pau=100\ cameras \pau=100\ and other things help me execute</a:t>
+              <a:t> </a:t>
+            </a:r>
+            <a:r>
+              <a:rPr lang="en-US" baseline="0" dirty="0" smtClean="0"/>
+              <a:t>lot of motors \pau=100\ sensors \pau=100\ cameras \pau=100\ and other things help me execute</a:t>
             </a:r>
             <a:r>
               <a:rPr lang="en-US" dirty="0" smtClean="0"/>
@@ -1488,7 +1563,7 @@
           <a:p>
             <a:fld id="{CA170544-50CD-4A50-8C95-C77DB03F35E0}" type="datetimeFigureOut">
               <a:rPr lang="en-US" smtClean="0"/>
-              <a:t>6/29/2021</a:t>
+              <a:t>7/8/2021</a:t>
             </a:fld>
             <a:endParaRPr lang="en-US"/>
           </a:p>
@@ -1658,7 +1733,7 @@
           <a:p>
             <a:fld id="{CA170544-50CD-4A50-8C95-C77DB03F35E0}" type="datetimeFigureOut">
               <a:rPr lang="en-US" smtClean="0"/>
-              <a:t>6/29/2021</a:t>
+              <a:t>7/8/2021</a:t>
             </a:fld>
             <a:endParaRPr lang="en-US"/>
           </a:p>
@@ -1838,7 +1913,7 @@
           <a:p>
             <a:fld id="{CA170544-50CD-4A50-8C95-C77DB03F35E0}" type="datetimeFigureOut">
               <a:rPr lang="en-US" smtClean="0"/>
-              <a:t>6/29/2021</a:t>
+              <a:t>7/8/2021</a:t>
             </a:fld>
             <a:endParaRPr lang="en-US"/>
           </a:p>
@@ -2008,7 +2083,7 @@
           <a:p>
             <a:fld id="{CA170544-50CD-4A50-8C95-C77DB03F35E0}" type="datetimeFigureOut">
               <a:rPr lang="en-US" smtClean="0"/>
-              <a:t>6/29/2021</a:t>
+              <a:t>7/8/2021</a:t>
             </a:fld>
             <a:endParaRPr lang="en-US"/>
           </a:p>
@@ -2254,7 +2329,7 @@
           <a:p>
             <a:fld id="{CA170544-50CD-4A50-8C95-C77DB03F35E0}" type="datetimeFigureOut">
               <a:rPr lang="en-US" smtClean="0"/>
-              <a:t>6/29/2021</a:t>
+              <a:t>7/8/2021</a:t>
             </a:fld>
             <a:endParaRPr lang="en-US"/>
           </a:p>
@@ -2486,7 +2561,7 @@
           <a:p>
             <a:fld id="{CA170544-50CD-4A50-8C95-C77DB03F35E0}" type="datetimeFigureOut">
               <a:rPr lang="en-US" smtClean="0"/>
-              <a:t>6/29/2021</a:t>
+              <a:t>7/8/2021</a:t>
             </a:fld>
             <a:endParaRPr lang="en-US"/>
           </a:p>
@@ -2853,7 +2928,7 @@
           <a:p>
             <a:fld id="{CA170544-50CD-4A50-8C95-C77DB03F35E0}" type="datetimeFigureOut">
               <a:rPr lang="en-US" smtClean="0"/>
-              <a:t>6/29/2021</a:t>
+              <a:t>7/8/2021</a:t>
             </a:fld>
             <a:endParaRPr lang="en-US"/>
           </a:p>
@@ -2971,7 +3046,7 @@
           <a:p>
             <a:fld id="{CA170544-50CD-4A50-8C95-C77DB03F35E0}" type="datetimeFigureOut">
               <a:rPr lang="en-US" smtClean="0"/>
-              <a:t>6/29/2021</a:t>
+              <a:t>7/8/2021</a:t>
             </a:fld>
             <a:endParaRPr lang="en-US"/>
           </a:p>
@@ -3066,7 +3141,7 @@
           <a:p>
             <a:fld id="{CA170544-50CD-4A50-8C95-C77DB03F35E0}" type="datetimeFigureOut">
               <a:rPr lang="en-US" smtClean="0"/>
-              <a:t>6/29/2021</a:t>
+              <a:t>7/8/2021</a:t>
             </a:fld>
             <a:endParaRPr lang="en-US"/>
           </a:p>
@@ -3343,7 +3418,7 @@
           <a:p>
             <a:fld id="{CA170544-50CD-4A50-8C95-C77DB03F35E0}" type="datetimeFigureOut">
               <a:rPr lang="en-US" smtClean="0"/>
-              <a:t>6/29/2021</a:t>
+              <a:t>7/8/2021</a:t>
             </a:fld>
             <a:endParaRPr lang="en-US"/>
           </a:p>
@@ -3596,7 +3671,7 @@
           <a:p>
             <a:fld id="{CA170544-50CD-4A50-8C95-C77DB03F35E0}" type="datetimeFigureOut">
               <a:rPr lang="en-US" smtClean="0"/>
-              <a:t>6/29/2021</a:t>
+              <a:t>7/8/2021</a:t>
             </a:fld>
             <a:endParaRPr lang="en-US"/>
           </a:p>
@@ -3809,7 +3884,7 @@
           <a:p>
             <a:fld id="{CA170544-50CD-4A50-8C95-C77DB03F35E0}" type="datetimeFigureOut">
               <a:rPr lang="en-US" smtClean="0"/>
-              <a:t>6/29/2021</a:t>
+              <a:t>7/8/2021</a:t>
             </a:fld>
             <a:endParaRPr lang="en-US"/>
           </a:p>

</xml_diff>

<commit_message>
add new tags (vol rspd rmode rst)
</commit_message>
<xml_diff>
--- a/presentations/naoPPTX.pptx
+++ b/presentations/naoPPTX.pptx
@@ -5,16 +5,17 @@
     <p:sldMasterId id="2147483648" r:id="rId1"/>
   </p:sldMasterIdLst>
   <p:notesMasterIdLst>
-    <p:notesMasterId r:id="rId9"/>
+    <p:notesMasterId r:id="rId10"/>
   </p:notesMasterIdLst>
   <p:sldIdLst>
-    <p:sldId id="256" r:id="rId2"/>
-    <p:sldId id="257" r:id="rId3"/>
-    <p:sldId id="258" r:id="rId4"/>
-    <p:sldId id="259" r:id="rId5"/>
-    <p:sldId id="262" r:id="rId6"/>
-    <p:sldId id="260" r:id="rId7"/>
-    <p:sldId id="261" r:id="rId8"/>
+    <p:sldId id="263" r:id="rId2"/>
+    <p:sldId id="256" r:id="rId3"/>
+    <p:sldId id="257" r:id="rId4"/>
+    <p:sldId id="258" r:id="rId5"/>
+    <p:sldId id="259" r:id="rId6"/>
+    <p:sldId id="262" r:id="rId7"/>
+    <p:sldId id="260" r:id="rId8"/>
+    <p:sldId id="261" r:id="rId9"/>
   </p:sldIdLst>
   <p:sldSz cx="12192000" cy="6858000"/>
   <p:notesSz cx="6858000" cy="9144000"/>
@@ -203,7 +204,7 @@
           <a:p>
             <a:fld id="{AB5941CB-9FBC-4619-9DA1-47A8A513573E}" type="datetimeFigureOut">
               <a:rPr lang="en-US" smtClean="0"/>
-              <a:t>7/12/2021</a:t>
+              <a:t>7/13/2021</a:t>
             </a:fld>
             <a:endParaRPr lang="en-US"/>
           </a:p>
@@ -517,111 +518,914 @@
           <a:p>
             <a:r>
               <a:rPr lang="en-US" dirty="0" smtClean="0"/>
-              <a:t>Hello! I am here to answer</a:t>
-            </a:r>
+              <a:t>Lets do some tests here</a:t>
+            </a:r>
+          </a:p>
+          <a:p>
             <a:r>
               <a:rPr lang="en-US" baseline="0" dirty="0" smtClean="0"/>
-              <a:t> one question. </a:t>
-            </a:r>
-          </a:p>
-          <a:p>
-            <a:r>
-              <a:rPr lang="en-US" sz="1200" b="0" i="0" kern="1200" dirty="0" smtClean="0">
-                <a:solidFill>
-                  <a:schemeClr val="tx1"/>
-                </a:solidFill>
-                <a:effectLst/>
-                <a:latin typeface="+mn-lt"/>
-                <a:ea typeface="+mn-ea"/>
-                <a:cs typeface="+mn-cs"/>
-              </a:rPr>
+              <a:t>&lt;pause time=“1000”/&gt; </a:t>
+            </a:r>
+          </a:p>
+          <a:p>
+            <a:r>
+              <a:rPr lang="en-US" dirty="0" smtClean="0"/>
+              <a:t>Test</a:t>
+            </a:r>
+            <a:r>
+              <a:rPr lang="en-US" baseline="0" dirty="0" smtClean="0"/>
+              <a:t> next &lt;next/&gt;</a:t>
+            </a:r>
+          </a:p>
+          <a:p>
+            <a:r>
+              <a:rPr lang="en-US" baseline="0" dirty="0" smtClean="0"/>
+              <a:t>&lt;pause time=“1000”/&gt; </a:t>
+            </a:r>
+          </a:p>
+          <a:p>
+            <a:endParaRPr lang="en-US" baseline="0" dirty="0" smtClean="0"/>
+          </a:p>
+          <a:p>
+            <a:r>
+              <a:rPr lang="en-US" dirty="0" smtClean="0"/>
+              <a:t>Test </a:t>
+            </a:r>
+            <a:r>
+              <a:rPr lang="en-US" sz="1200" kern="1200" dirty="0" err="1" smtClean="0">
+                <a:solidFill>
+                  <a:schemeClr val="tx1"/>
+                </a:solidFill>
+                <a:effectLst/>
+                <a:latin typeface="+mn-lt"/>
+                <a:ea typeface="+mn-ea"/>
+                <a:cs typeface="+mn-cs"/>
+              </a:rPr>
+              <a:t>rmode</a:t>
+            </a:r>
+            <a:r>
+              <a:rPr lang="en-US" sz="1200" kern="1200" dirty="0" smtClean="0">
+                <a:solidFill>
+                  <a:schemeClr val="tx1"/>
+                </a:solidFill>
+                <a:effectLst/>
+                <a:latin typeface="+mn-lt"/>
+                <a:ea typeface="+mn-ea"/>
+                <a:cs typeface="+mn-cs"/>
+              </a:rPr>
+              <a:t> 2 &lt;</a:t>
+            </a:r>
+            <a:r>
+              <a:rPr lang="en-US" sz="1200" kern="1200" dirty="0" err="1" smtClean="0">
+                <a:solidFill>
+                  <a:schemeClr val="tx1"/>
+                </a:solidFill>
+                <a:effectLst/>
+                <a:latin typeface="+mn-lt"/>
+                <a:ea typeface="+mn-ea"/>
+                <a:cs typeface="+mn-cs"/>
+              </a:rPr>
+              <a:t>rmode</a:t>
+            </a:r>
+            <a:r>
+              <a:rPr lang="en-US" sz="1200" kern="1200" dirty="0" smtClean="0">
+                <a:solidFill>
+                  <a:schemeClr val="tx1"/>
+                </a:solidFill>
+                <a:effectLst/>
+                <a:latin typeface="+mn-lt"/>
+                <a:ea typeface="+mn-ea"/>
+                <a:cs typeface="+mn-cs"/>
+              </a:rPr>
+              <a:t> mode</a:t>
+            </a:r>
+            <a:r>
+              <a:rPr lang="en-US" sz="1200" kern="1200" baseline="0" dirty="0" smtClean="0">
+                <a:solidFill>
+                  <a:schemeClr val="tx1"/>
+                </a:solidFill>
+                <a:effectLst/>
+                <a:latin typeface="+mn-lt"/>
+                <a:ea typeface="+mn-ea"/>
+                <a:cs typeface="+mn-cs"/>
+              </a:rPr>
+              <a:t>=“</a:t>
+            </a:r>
+            <a:r>
+              <a:rPr lang="en-US" dirty="0" smtClean="0"/>
+              <a:t>word</a:t>
+            </a:r>
+            <a:r>
+              <a:rPr lang="en-US" sz="1200" kern="1200" baseline="0" dirty="0" smtClean="0">
+                <a:solidFill>
+                  <a:schemeClr val="tx1"/>
+                </a:solidFill>
+                <a:effectLst/>
+                <a:latin typeface="+mn-lt"/>
+                <a:ea typeface="+mn-ea"/>
+                <a:cs typeface="+mn-cs"/>
+              </a:rPr>
+              <a:t>”</a:t>
+            </a:r>
+            <a:r>
+              <a:rPr lang="en-US" sz="1200" kern="1200" dirty="0" smtClean="0">
+                <a:solidFill>
+                  <a:schemeClr val="tx1"/>
+                </a:solidFill>
+                <a:effectLst/>
+                <a:latin typeface="+mn-lt"/>
+                <a:ea typeface="+mn-ea"/>
+                <a:cs typeface="+mn-cs"/>
+              </a:rPr>
+              <a:t>&gt; </a:t>
+            </a:r>
+            <a:r>
+              <a:rPr lang="en-US" dirty="0" smtClean="0"/>
+              <a:t>word and word</a:t>
+            </a:r>
+            <a:r>
+              <a:rPr lang="en-US" baseline="0" dirty="0" smtClean="0"/>
+              <a:t> and word &lt;/</a:t>
+            </a:r>
+            <a:r>
+              <a:rPr lang="en-US" baseline="0" dirty="0" err="1" smtClean="0"/>
+              <a:t>rmode</a:t>
+            </a:r>
+            <a:r>
+              <a:rPr lang="en-US" baseline="0" dirty="0" smtClean="0"/>
+              <a:t>&gt; reset to default check </a:t>
+            </a:r>
+            <a:r>
+              <a:rPr lang="en-US" dirty="0" smtClean="0"/>
               <a:t>&lt;</a:t>
             </a:r>
             <a:r>
-              <a:rPr lang="en-US" sz="1200" b="0" i="0" kern="1200" smtClean="0">
-                <a:solidFill>
-                  <a:schemeClr val="tx1"/>
-                </a:solidFill>
-                <a:effectLst/>
-                <a:latin typeface="+mn-lt"/>
-                <a:ea typeface="+mn-ea"/>
-                <a:cs typeface="+mn-cs"/>
-              </a:rPr>
-              <a:t>next</a:t>
-            </a:r>
-            <a:r>
-              <a:rPr lang="en-US" sz="1200" b="0" i="0" kern="1200" smtClean="0">
-                <a:solidFill>
-                  <a:schemeClr val="tx1"/>
-                </a:solidFill>
-                <a:effectLst/>
-                <a:latin typeface="+mn-lt"/>
-                <a:ea typeface="+mn-ea"/>
-                <a:cs typeface="+mn-cs"/>
-              </a:rPr>
-              <a:t>/&gt;</a:t>
-            </a:r>
-            <a:r>
-              <a:rPr lang="en-US" sz="1200" b="0" i="0" kern="1200" baseline="0" smtClean="0">
-                <a:solidFill>
-                  <a:schemeClr val="tx1"/>
-                </a:solidFill>
-                <a:effectLst/>
-                <a:latin typeface="+mn-lt"/>
-                <a:ea typeface="+mn-ea"/>
-                <a:cs typeface="+mn-cs"/>
-              </a:rPr>
-              <a:t> </a:t>
-            </a:r>
-            <a:r>
-              <a:rPr lang="en-US" smtClean="0"/>
-              <a:t>What</a:t>
-            </a:r>
-            <a:r>
-              <a:rPr lang="en-US" baseline="0" smtClean="0"/>
-              <a:t> </a:t>
-            </a:r>
-            <a:r>
-              <a:rPr lang="en-US" sz="1200" b="0" i="0" kern="1200" dirty="0" smtClean="0">
-                <a:solidFill>
-                  <a:schemeClr val="tx1"/>
-                </a:solidFill>
-                <a:effectLst/>
-                <a:latin typeface="+mn-lt"/>
-                <a:ea typeface="+mn-ea"/>
-                <a:cs typeface="+mn-cs"/>
-              </a:rPr>
-              <a:t>&lt;pause</a:t>
-            </a:r>
-            <a:r>
-              <a:rPr lang="en-US" sz="1200" b="0" i="0" kern="1200" baseline="0" dirty="0" smtClean="0">
-                <a:solidFill>
-                  <a:schemeClr val="tx1"/>
-                </a:solidFill>
-                <a:effectLst/>
-                <a:latin typeface="+mn-lt"/>
-                <a:ea typeface="+mn-ea"/>
-                <a:cs typeface="+mn-cs"/>
-              </a:rPr>
-              <a:t> time=“400”/</a:t>
-            </a:r>
-            <a:r>
-              <a:rPr lang="en-US" sz="1200" b="0" i="0" kern="1200" dirty="0" smtClean="0">
-                <a:solidFill>
-                  <a:schemeClr val="tx1"/>
-                </a:solidFill>
-                <a:effectLst/>
-                <a:latin typeface="+mn-lt"/>
-                <a:ea typeface="+mn-ea"/>
-                <a:cs typeface="+mn-cs"/>
-              </a:rPr>
+              <a:rPr lang="en-US" dirty="0" err="1" smtClean="0"/>
+              <a:t>rmode</a:t>
+            </a:r>
+            <a:r>
+              <a:rPr lang="en-US" dirty="0" smtClean="0"/>
+              <a:t> mode=“sent”&gt; sent and sent and sent &lt;/</a:t>
+            </a:r>
+            <a:r>
+              <a:rPr lang="en-US" baseline="0" dirty="0" err="1" smtClean="0"/>
+              <a:t>rmode</a:t>
+            </a:r>
+            <a:r>
+              <a:rPr lang="en-US" dirty="0" smtClean="0"/>
               <a:t>&gt;</a:t>
             </a:r>
             <a:r>
               <a:rPr lang="en-US" baseline="0" dirty="0" smtClean="0"/>
-              <a:t> is Nao?</a:t>
-            </a:r>
-            <a:endParaRPr lang="en-US" dirty="0"/>
+              <a:t> &lt;</a:t>
+            </a:r>
+            <a:r>
+              <a:rPr lang="en-US" baseline="0" dirty="0" err="1" smtClean="0"/>
+              <a:t>rmode</a:t>
+            </a:r>
+            <a:r>
+              <a:rPr lang="en-US" baseline="0" dirty="0" smtClean="0"/>
+              <a:t> mode=“char”&gt; char TSI and TSI &lt;/</a:t>
+            </a:r>
+            <a:r>
+              <a:rPr lang="en-US" baseline="0" dirty="0" err="1" smtClean="0"/>
+              <a:t>rmode</a:t>
+            </a:r>
+            <a:r>
+              <a:rPr lang="en-US" baseline="0" dirty="0" smtClean="0"/>
+              <a:t>&gt; </a:t>
+            </a:r>
+          </a:p>
+          <a:p>
+            <a:pPr marL="0" marR="0" lvl="0" indent="0" algn="l" defTabSz="914400" rtl="0" eaLnBrk="1" fontAlgn="auto" latinLnBrk="0" hangingPunct="1">
+              <a:lnSpc>
+                <a:spcPct val="100000"/>
+              </a:lnSpc>
+              <a:spcBef>
+                <a:spcPts val="0"/>
+              </a:spcBef>
+              <a:spcAft>
+                <a:spcPts val="0"/>
+              </a:spcAft>
+              <a:buClrTx/>
+              <a:buSzTx/>
+              <a:buFontTx/>
+              <a:buNone/>
+              <a:tabLst/>
+              <a:defRPr/>
+            </a:pPr>
+            <a:r>
+              <a:rPr lang="en-US" baseline="0" dirty="0" smtClean="0"/>
+              <a:t>&lt;pause time=“1000”/&gt; </a:t>
+            </a:r>
+            <a:endParaRPr lang="en-US" dirty="0" smtClean="0"/>
+          </a:p>
+          <a:p>
+            <a:endParaRPr lang="en-US" baseline="0" dirty="0" smtClean="0"/>
+          </a:p>
+          <a:p>
+            <a:endParaRPr lang="en-US" baseline="0" dirty="0" smtClean="0"/>
+          </a:p>
+          <a:p>
+            <a:r>
+              <a:rPr lang="en-US" baseline="0" dirty="0" smtClean="0"/>
+              <a:t>Test pause &lt;pause time=“1000”/&gt; end</a:t>
+            </a:r>
+          </a:p>
+          <a:p>
+            <a:r>
+              <a:rPr lang="en-US" baseline="0" dirty="0" smtClean="0"/>
+              <a:t>&lt;pause time=“1000”/&gt; </a:t>
+            </a:r>
+          </a:p>
+          <a:p>
+            <a:endParaRPr lang="en-US" baseline="0" dirty="0" smtClean="0"/>
+          </a:p>
+          <a:p>
+            <a:r>
+              <a:rPr lang="en-US" baseline="0" dirty="0" smtClean="0"/>
+              <a:t>Test </a:t>
+            </a:r>
+            <a:r>
+              <a:rPr lang="en-US" sz="1200" kern="1200" dirty="0" err="1" smtClean="0">
+                <a:solidFill>
+                  <a:schemeClr val="tx1"/>
+                </a:solidFill>
+                <a:effectLst/>
+                <a:latin typeface="+mn-lt"/>
+                <a:ea typeface="+mn-ea"/>
+                <a:cs typeface="+mn-cs"/>
+              </a:rPr>
+              <a:t>emph</a:t>
+            </a:r>
+            <a:r>
+              <a:rPr lang="en-US" sz="1200" kern="1200" dirty="0" smtClean="0">
+                <a:solidFill>
+                  <a:schemeClr val="tx1"/>
+                </a:solidFill>
+                <a:effectLst/>
+                <a:latin typeface="+mn-lt"/>
+                <a:ea typeface="+mn-ea"/>
+                <a:cs typeface="+mn-cs"/>
+              </a:rPr>
+              <a:t> 0&lt;</a:t>
+            </a:r>
+            <a:r>
+              <a:rPr lang="en-US" sz="1200" kern="1200" dirty="0" err="1" smtClean="0">
+                <a:solidFill>
+                  <a:schemeClr val="tx1"/>
+                </a:solidFill>
+                <a:effectLst/>
+                <a:latin typeface="+mn-lt"/>
+                <a:ea typeface="+mn-ea"/>
+                <a:cs typeface="+mn-cs"/>
+              </a:rPr>
+              <a:t>emph</a:t>
+            </a:r>
+            <a:r>
+              <a:rPr lang="en-US" sz="1200" kern="1200" dirty="0" smtClean="0">
+                <a:solidFill>
+                  <a:schemeClr val="tx1"/>
+                </a:solidFill>
+                <a:effectLst/>
+                <a:latin typeface="+mn-lt"/>
+                <a:ea typeface="+mn-ea"/>
+                <a:cs typeface="+mn-cs"/>
+              </a:rPr>
+              <a:t> word=“Garbage” </a:t>
+            </a:r>
+            <a:r>
+              <a:rPr lang="en-US" sz="1200" kern="1200" dirty="0" err="1" smtClean="0">
+                <a:solidFill>
+                  <a:schemeClr val="tx1"/>
+                </a:solidFill>
+                <a:effectLst/>
+                <a:latin typeface="+mn-lt"/>
+                <a:ea typeface="+mn-ea"/>
+                <a:cs typeface="+mn-cs"/>
+              </a:rPr>
+              <a:t>pos</a:t>
+            </a:r>
+            <a:r>
+              <a:rPr lang="en-US" sz="1200" kern="1200" dirty="0" smtClean="0">
+                <a:solidFill>
+                  <a:schemeClr val="tx1"/>
+                </a:solidFill>
+                <a:effectLst/>
+                <a:latin typeface="+mn-lt"/>
+                <a:ea typeface="+mn-ea"/>
+                <a:cs typeface="+mn-cs"/>
+              </a:rPr>
+              <a:t>=“0”/&gt; 1 &lt;</a:t>
+            </a:r>
+            <a:r>
+              <a:rPr lang="en-US" sz="1200" kern="1200" dirty="0" err="1" smtClean="0">
+                <a:solidFill>
+                  <a:schemeClr val="tx1"/>
+                </a:solidFill>
+                <a:effectLst/>
+                <a:latin typeface="+mn-lt"/>
+                <a:ea typeface="+mn-ea"/>
+                <a:cs typeface="+mn-cs"/>
+              </a:rPr>
+              <a:t>emph</a:t>
+            </a:r>
+            <a:r>
+              <a:rPr lang="en-US" sz="1200" kern="1200" dirty="0" smtClean="0">
+                <a:solidFill>
+                  <a:schemeClr val="tx1"/>
+                </a:solidFill>
+                <a:effectLst/>
+                <a:latin typeface="+mn-lt"/>
+                <a:ea typeface="+mn-ea"/>
+                <a:cs typeface="+mn-cs"/>
+              </a:rPr>
+              <a:t> word=“Garbage” </a:t>
+            </a:r>
+            <a:r>
+              <a:rPr lang="en-US" sz="1200" kern="1200" dirty="0" err="1" smtClean="0">
+                <a:solidFill>
+                  <a:schemeClr val="tx1"/>
+                </a:solidFill>
+                <a:effectLst/>
+                <a:latin typeface="+mn-lt"/>
+                <a:ea typeface="+mn-ea"/>
+                <a:cs typeface="+mn-cs"/>
+              </a:rPr>
+              <a:t>pos</a:t>
+            </a:r>
+            <a:r>
+              <a:rPr lang="en-US" sz="1200" kern="1200" dirty="0" smtClean="0">
+                <a:solidFill>
+                  <a:schemeClr val="tx1"/>
+                </a:solidFill>
+                <a:effectLst/>
+                <a:latin typeface="+mn-lt"/>
+                <a:ea typeface="+mn-ea"/>
+                <a:cs typeface="+mn-cs"/>
+              </a:rPr>
+              <a:t>=“1”/&gt; 2 &lt;</a:t>
+            </a:r>
+            <a:r>
+              <a:rPr lang="en-US" sz="1200" kern="1200" dirty="0" err="1" smtClean="0">
+                <a:solidFill>
+                  <a:schemeClr val="tx1"/>
+                </a:solidFill>
+                <a:effectLst/>
+                <a:latin typeface="+mn-lt"/>
+                <a:ea typeface="+mn-ea"/>
+                <a:cs typeface="+mn-cs"/>
+              </a:rPr>
+              <a:t>emph</a:t>
+            </a:r>
+            <a:r>
+              <a:rPr lang="en-US" sz="1200" kern="1200" dirty="0" smtClean="0">
+                <a:solidFill>
+                  <a:schemeClr val="tx1"/>
+                </a:solidFill>
+                <a:effectLst/>
+                <a:latin typeface="+mn-lt"/>
+                <a:ea typeface="+mn-ea"/>
+                <a:cs typeface="+mn-cs"/>
+              </a:rPr>
+              <a:t> word=“Garbage” </a:t>
+            </a:r>
+            <a:r>
+              <a:rPr lang="en-US" sz="1200" kern="1200" dirty="0" err="1" smtClean="0">
+                <a:solidFill>
+                  <a:schemeClr val="tx1"/>
+                </a:solidFill>
+                <a:effectLst/>
+                <a:latin typeface="+mn-lt"/>
+                <a:ea typeface="+mn-ea"/>
+                <a:cs typeface="+mn-cs"/>
+              </a:rPr>
+              <a:t>pos</a:t>
+            </a:r>
+            <a:r>
+              <a:rPr lang="en-US" sz="1200" kern="1200" dirty="0" smtClean="0">
+                <a:solidFill>
+                  <a:schemeClr val="tx1"/>
+                </a:solidFill>
+                <a:effectLst/>
+                <a:latin typeface="+mn-lt"/>
+                <a:ea typeface="+mn-ea"/>
+                <a:cs typeface="+mn-cs"/>
+              </a:rPr>
+              <a:t>=“2”/&gt; </a:t>
+            </a:r>
+          </a:p>
+          <a:p>
+            <a:r>
+              <a:rPr lang="en-US" baseline="0" dirty="0" smtClean="0"/>
+              <a:t>&lt;pause time=“1000”/&gt; </a:t>
+            </a:r>
+          </a:p>
+          <a:p>
+            <a:endParaRPr lang="en-US" sz="1200" kern="1200" dirty="0" smtClean="0">
+              <a:solidFill>
+                <a:schemeClr val="tx1"/>
+              </a:solidFill>
+              <a:effectLst/>
+              <a:latin typeface="+mn-lt"/>
+              <a:ea typeface="+mn-ea"/>
+              <a:cs typeface="+mn-cs"/>
+            </a:endParaRPr>
+          </a:p>
+          <a:p>
+            <a:r>
+              <a:rPr lang="en-US" sz="1200" kern="1200" dirty="0" smtClean="0">
+                <a:solidFill>
+                  <a:schemeClr val="tx1"/>
+                </a:solidFill>
+                <a:effectLst/>
+                <a:latin typeface="+mn-lt"/>
+                <a:ea typeface="+mn-ea"/>
+                <a:cs typeface="+mn-cs"/>
+              </a:rPr>
+              <a:t>Test volume </a:t>
+            </a:r>
+            <a:r>
+              <a:rPr lang="en-US" sz="1200" kern="1200" baseline="0" dirty="0" smtClean="0">
+                <a:solidFill>
+                  <a:schemeClr val="tx1"/>
+                </a:solidFill>
+                <a:effectLst/>
+                <a:latin typeface="+mn-lt"/>
+                <a:ea typeface="+mn-ea"/>
+                <a:cs typeface="+mn-cs"/>
+              </a:rPr>
+              <a:t>&lt;</a:t>
+            </a:r>
+            <a:r>
+              <a:rPr lang="en-US" sz="1200" kern="1200" baseline="0" dirty="0" err="1" smtClean="0">
+                <a:solidFill>
+                  <a:schemeClr val="tx1"/>
+                </a:solidFill>
+                <a:effectLst/>
+                <a:latin typeface="+mn-lt"/>
+                <a:ea typeface="+mn-ea"/>
+                <a:cs typeface="+mn-cs"/>
+              </a:rPr>
+              <a:t>vol</a:t>
+            </a:r>
+            <a:r>
+              <a:rPr lang="en-US" sz="1200" kern="1200" baseline="0" dirty="0" smtClean="0">
+                <a:solidFill>
+                  <a:schemeClr val="tx1"/>
+                </a:solidFill>
+                <a:effectLst/>
+                <a:latin typeface="+mn-lt"/>
+                <a:ea typeface="+mn-ea"/>
+                <a:cs typeface="+mn-cs"/>
+              </a:rPr>
+              <a:t> value=“30”/&gt; 30 % &lt;</a:t>
+            </a:r>
+            <a:r>
+              <a:rPr lang="en-US" sz="1200" kern="1200" baseline="0" dirty="0" err="1" smtClean="0">
+                <a:solidFill>
+                  <a:schemeClr val="tx1"/>
+                </a:solidFill>
+                <a:effectLst/>
+                <a:latin typeface="+mn-lt"/>
+                <a:ea typeface="+mn-ea"/>
+                <a:cs typeface="+mn-cs"/>
+              </a:rPr>
+              <a:t>vol</a:t>
+            </a:r>
+            <a:r>
+              <a:rPr lang="en-US" sz="1200" kern="1200" baseline="0" dirty="0" smtClean="0">
+                <a:solidFill>
+                  <a:schemeClr val="tx1"/>
+                </a:solidFill>
+                <a:effectLst/>
+                <a:latin typeface="+mn-lt"/>
+                <a:ea typeface="+mn-ea"/>
+                <a:cs typeface="+mn-cs"/>
+              </a:rPr>
+              <a:t> value=“100”/&gt; 100 % &lt;</a:t>
+            </a:r>
+            <a:r>
+              <a:rPr lang="en-US" sz="1200" kern="1200" baseline="0" dirty="0" err="1" smtClean="0">
+                <a:solidFill>
+                  <a:schemeClr val="tx1"/>
+                </a:solidFill>
+                <a:effectLst/>
+                <a:latin typeface="+mn-lt"/>
+                <a:ea typeface="+mn-ea"/>
+                <a:cs typeface="+mn-cs"/>
+              </a:rPr>
+              <a:t>vol</a:t>
+            </a:r>
+            <a:r>
+              <a:rPr lang="en-US" sz="1200" kern="1200" baseline="0" dirty="0" smtClean="0">
+                <a:solidFill>
+                  <a:schemeClr val="tx1"/>
+                </a:solidFill>
+                <a:effectLst/>
+                <a:latin typeface="+mn-lt"/>
+                <a:ea typeface="+mn-ea"/>
+                <a:cs typeface="+mn-cs"/>
+              </a:rPr>
+              <a:t> value=“50”/&gt; 50 %</a:t>
+            </a:r>
+          </a:p>
+          <a:p>
+            <a:r>
+              <a:rPr lang="en-US" baseline="0" dirty="0" smtClean="0"/>
+              <a:t>&lt;pause time=“1000”/&gt; </a:t>
+            </a:r>
+          </a:p>
+          <a:p>
+            <a:endParaRPr lang="en-US" sz="1200" kern="1200" baseline="0" dirty="0" smtClean="0">
+              <a:solidFill>
+                <a:schemeClr val="tx1"/>
+              </a:solidFill>
+              <a:effectLst/>
+              <a:latin typeface="+mn-lt"/>
+              <a:ea typeface="+mn-ea"/>
+              <a:cs typeface="+mn-cs"/>
+            </a:endParaRPr>
+          </a:p>
+          <a:p>
+            <a:r>
+              <a:rPr lang="en-US" sz="1200" kern="1200" baseline="0" dirty="0" smtClean="0">
+                <a:solidFill>
+                  <a:schemeClr val="tx1"/>
+                </a:solidFill>
+                <a:effectLst/>
+                <a:latin typeface="+mn-lt"/>
+                <a:ea typeface="+mn-ea"/>
+                <a:cs typeface="+mn-cs"/>
+              </a:rPr>
+              <a:t>Test set &lt;</a:t>
+            </a:r>
+            <a:r>
+              <a:rPr lang="en-US" sz="1200" kern="1200" dirty="0" smtClean="0">
+                <a:solidFill>
+                  <a:schemeClr val="tx1"/>
+                </a:solidFill>
+                <a:effectLst/>
+                <a:latin typeface="+mn-lt"/>
+                <a:ea typeface="+mn-ea"/>
+                <a:cs typeface="+mn-cs"/>
+              </a:rPr>
+              <a:t>set voice=“</a:t>
+            </a:r>
+            <a:r>
+              <a:rPr lang="en-US" dirty="0" smtClean="0"/>
+              <a:t>joyful</a:t>
+            </a:r>
+            <a:r>
+              <a:rPr lang="en-US" sz="1200" kern="1200" dirty="0" smtClean="0">
+                <a:solidFill>
+                  <a:schemeClr val="tx1"/>
+                </a:solidFill>
+                <a:effectLst/>
+                <a:latin typeface="+mn-lt"/>
+                <a:ea typeface="+mn-ea"/>
+                <a:cs typeface="+mn-cs"/>
+              </a:rPr>
+              <a:t>”/</a:t>
+            </a:r>
+            <a:r>
+              <a:rPr lang="en-US" sz="1200" kern="1200" baseline="0" dirty="0" smtClean="0">
+                <a:solidFill>
+                  <a:schemeClr val="tx1"/>
+                </a:solidFill>
+                <a:effectLst/>
+                <a:latin typeface="+mn-lt"/>
+                <a:ea typeface="+mn-ea"/>
+                <a:cs typeface="+mn-cs"/>
+              </a:rPr>
+              <a:t>&gt; </a:t>
+            </a:r>
+            <a:r>
+              <a:rPr lang="en-US" dirty="0" smtClean="0"/>
+              <a:t>joyful &lt;set voice=“didactic”/&gt; didactic &lt;set voice=“neutral”/&gt; neutral</a:t>
+            </a:r>
+          </a:p>
+          <a:p>
+            <a:r>
+              <a:rPr lang="en-US" baseline="0" dirty="0" smtClean="0"/>
+              <a:t>&lt;pause time=“1000”/&gt; </a:t>
+            </a:r>
+          </a:p>
+          <a:p>
+            <a:endParaRPr lang="en-US" dirty="0" smtClean="0"/>
+          </a:p>
+          <a:p>
+            <a:r>
+              <a:rPr lang="en-US" sz="1200" kern="1200" baseline="0" dirty="0" smtClean="0">
+                <a:solidFill>
+                  <a:schemeClr val="tx1"/>
+                </a:solidFill>
+                <a:effectLst/>
+                <a:latin typeface="+mn-lt"/>
+                <a:ea typeface="+mn-ea"/>
+                <a:cs typeface="+mn-cs"/>
+              </a:rPr>
+              <a:t>Test </a:t>
+            </a:r>
+            <a:r>
+              <a:rPr lang="en-US" sz="1200" kern="1200" dirty="0" err="1" smtClean="0">
+                <a:solidFill>
+                  <a:schemeClr val="tx1"/>
+                </a:solidFill>
+                <a:effectLst/>
+                <a:latin typeface="+mn-lt"/>
+                <a:ea typeface="+mn-ea"/>
+                <a:cs typeface="+mn-cs"/>
+              </a:rPr>
+              <a:t>rspd</a:t>
+            </a:r>
+            <a:r>
+              <a:rPr lang="en-US" sz="1200" kern="1200" dirty="0" smtClean="0">
+                <a:solidFill>
+                  <a:schemeClr val="tx1"/>
+                </a:solidFill>
+                <a:effectLst/>
+                <a:latin typeface="+mn-lt"/>
+                <a:ea typeface="+mn-ea"/>
+                <a:cs typeface="+mn-cs"/>
+              </a:rPr>
+              <a:t> &lt;</a:t>
+            </a:r>
+            <a:r>
+              <a:rPr lang="en-US" sz="1200" kern="1200" dirty="0" err="1" smtClean="0">
+                <a:solidFill>
+                  <a:schemeClr val="tx1"/>
+                </a:solidFill>
+                <a:effectLst/>
+                <a:latin typeface="+mn-lt"/>
+                <a:ea typeface="+mn-ea"/>
+                <a:cs typeface="+mn-cs"/>
+              </a:rPr>
+              <a:t>rspd</a:t>
+            </a:r>
+            <a:r>
+              <a:rPr lang="en-US" sz="1200" kern="1200" dirty="0" smtClean="0">
+                <a:solidFill>
+                  <a:schemeClr val="tx1"/>
+                </a:solidFill>
+                <a:effectLst/>
+                <a:latin typeface="+mn-lt"/>
+                <a:ea typeface="+mn-ea"/>
+                <a:cs typeface="+mn-cs"/>
+              </a:rPr>
+              <a:t> speed=“30”/&gt; 30 % &lt;</a:t>
+            </a:r>
+            <a:r>
+              <a:rPr lang="en-US" sz="1200" kern="1200" dirty="0" err="1" smtClean="0">
+                <a:solidFill>
+                  <a:schemeClr val="tx1"/>
+                </a:solidFill>
+                <a:effectLst/>
+                <a:latin typeface="+mn-lt"/>
+                <a:ea typeface="+mn-ea"/>
+                <a:cs typeface="+mn-cs"/>
+              </a:rPr>
+              <a:t>rspd</a:t>
+            </a:r>
+            <a:r>
+              <a:rPr lang="en-US" sz="1200" kern="1200" dirty="0" smtClean="0">
+                <a:solidFill>
+                  <a:schemeClr val="tx1"/>
+                </a:solidFill>
+                <a:effectLst/>
+                <a:latin typeface="+mn-lt"/>
+                <a:ea typeface="+mn-ea"/>
+                <a:cs typeface="+mn-cs"/>
+              </a:rPr>
+              <a:t> speed=“300”/&gt; 300 % &lt;</a:t>
+            </a:r>
+            <a:r>
+              <a:rPr lang="en-US" sz="1200" kern="1200" dirty="0" err="1" smtClean="0">
+                <a:solidFill>
+                  <a:schemeClr val="tx1"/>
+                </a:solidFill>
+                <a:effectLst/>
+                <a:latin typeface="+mn-lt"/>
+                <a:ea typeface="+mn-ea"/>
+                <a:cs typeface="+mn-cs"/>
+              </a:rPr>
+              <a:t>rspd</a:t>
+            </a:r>
+            <a:r>
+              <a:rPr lang="en-US" sz="1200" kern="1200" dirty="0" smtClean="0">
+                <a:solidFill>
+                  <a:schemeClr val="tx1"/>
+                </a:solidFill>
+                <a:effectLst/>
+                <a:latin typeface="+mn-lt"/>
+                <a:ea typeface="+mn-ea"/>
+                <a:cs typeface="+mn-cs"/>
+              </a:rPr>
+              <a:t> speed=“100”/&gt; 100 %</a:t>
+            </a:r>
+          </a:p>
+          <a:p>
+            <a:pPr marL="0" marR="0" lvl="0" indent="0" algn="l" defTabSz="914400" rtl="0" eaLnBrk="1" fontAlgn="auto" latinLnBrk="0" hangingPunct="1">
+              <a:lnSpc>
+                <a:spcPct val="100000"/>
+              </a:lnSpc>
+              <a:spcBef>
+                <a:spcPts val="0"/>
+              </a:spcBef>
+              <a:spcAft>
+                <a:spcPts val="0"/>
+              </a:spcAft>
+              <a:buClrTx/>
+              <a:buSzTx/>
+              <a:buFontTx/>
+              <a:buNone/>
+              <a:tabLst/>
+              <a:defRPr/>
+            </a:pPr>
+            <a:r>
+              <a:rPr lang="en-US" baseline="0" dirty="0" smtClean="0"/>
+              <a:t>&lt;pause time=“1000”/&gt; </a:t>
+            </a:r>
+            <a:endParaRPr lang="en-US" dirty="0" smtClean="0"/>
+          </a:p>
+          <a:p>
+            <a:endParaRPr lang="en-US" sz="1200" kern="1200" dirty="0" smtClean="0">
+              <a:solidFill>
+                <a:schemeClr val="tx1"/>
+              </a:solidFill>
+              <a:effectLst/>
+              <a:latin typeface="+mn-lt"/>
+              <a:ea typeface="+mn-ea"/>
+              <a:cs typeface="+mn-cs"/>
+            </a:endParaRPr>
+          </a:p>
+          <a:p>
+            <a:r>
+              <a:rPr lang="en-US" dirty="0" smtClean="0"/>
+              <a:t>Test </a:t>
+            </a:r>
+            <a:r>
+              <a:rPr lang="en-US" sz="1200" kern="1200" dirty="0" err="1" smtClean="0">
+                <a:solidFill>
+                  <a:schemeClr val="tx1"/>
+                </a:solidFill>
+                <a:effectLst/>
+                <a:latin typeface="+mn-lt"/>
+                <a:ea typeface="+mn-ea"/>
+                <a:cs typeface="+mn-cs"/>
+              </a:rPr>
+              <a:t>rmode</a:t>
+            </a:r>
+            <a:r>
+              <a:rPr lang="en-US" sz="1200" kern="1200" dirty="0" smtClean="0">
+                <a:solidFill>
+                  <a:schemeClr val="tx1"/>
+                </a:solidFill>
+                <a:effectLst/>
+                <a:latin typeface="+mn-lt"/>
+                <a:ea typeface="+mn-ea"/>
+                <a:cs typeface="+mn-cs"/>
+              </a:rPr>
+              <a:t> &lt;</a:t>
+            </a:r>
+            <a:r>
+              <a:rPr lang="en-US" sz="1200" kern="1200" dirty="0" err="1" smtClean="0">
+                <a:solidFill>
+                  <a:schemeClr val="tx1"/>
+                </a:solidFill>
+                <a:effectLst/>
+                <a:latin typeface="+mn-lt"/>
+                <a:ea typeface="+mn-ea"/>
+                <a:cs typeface="+mn-cs"/>
+              </a:rPr>
+              <a:t>rmode</a:t>
+            </a:r>
+            <a:r>
+              <a:rPr lang="en-US" sz="1200" kern="1200" dirty="0" smtClean="0">
+                <a:solidFill>
+                  <a:schemeClr val="tx1"/>
+                </a:solidFill>
+                <a:effectLst/>
+                <a:latin typeface="+mn-lt"/>
+                <a:ea typeface="+mn-ea"/>
+                <a:cs typeface="+mn-cs"/>
+              </a:rPr>
+              <a:t> mode</a:t>
+            </a:r>
+            <a:r>
+              <a:rPr lang="en-US" sz="1200" kern="1200" baseline="0" dirty="0" smtClean="0">
+                <a:solidFill>
+                  <a:schemeClr val="tx1"/>
+                </a:solidFill>
+                <a:effectLst/>
+                <a:latin typeface="+mn-lt"/>
+                <a:ea typeface="+mn-ea"/>
+                <a:cs typeface="+mn-cs"/>
+              </a:rPr>
+              <a:t>=“</a:t>
+            </a:r>
+            <a:r>
+              <a:rPr lang="en-US" dirty="0" smtClean="0"/>
+              <a:t>word</a:t>
+            </a:r>
+            <a:r>
+              <a:rPr lang="en-US" sz="1200" kern="1200" baseline="0" dirty="0" smtClean="0">
+                <a:solidFill>
+                  <a:schemeClr val="tx1"/>
+                </a:solidFill>
+                <a:effectLst/>
+                <a:latin typeface="+mn-lt"/>
+                <a:ea typeface="+mn-ea"/>
+                <a:cs typeface="+mn-cs"/>
+              </a:rPr>
+              <a:t>”/</a:t>
+            </a:r>
+            <a:r>
+              <a:rPr lang="en-US" sz="1200" kern="1200" dirty="0" smtClean="0">
+                <a:solidFill>
+                  <a:schemeClr val="tx1"/>
+                </a:solidFill>
+                <a:effectLst/>
+                <a:latin typeface="+mn-lt"/>
+                <a:ea typeface="+mn-ea"/>
+                <a:cs typeface="+mn-cs"/>
+              </a:rPr>
+              <a:t>&gt; </a:t>
+            </a:r>
+            <a:r>
+              <a:rPr lang="en-US" dirty="0" smtClean="0"/>
+              <a:t>word &lt;</a:t>
+            </a:r>
+            <a:r>
+              <a:rPr lang="en-US" dirty="0" err="1" smtClean="0"/>
+              <a:t>rmode</a:t>
+            </a:r>
+            <a:r>
+              <a:rPr lang="en-US" dirty="0" smtClean="0"/>
+              <a:t> mode=“sent”/&gt; sent</a:t>
+            </a:r>
+            <a:r>
+              <a:rPr lang="en-US" baseline="0" dirty="0" smtClean="0"/>
+              <a:t> &lt;</a:t>
+            </a:r>
+            <a:r>
+              <a:rPr lang="en-US" baseline="0" dirty="0" err="1" smtClean="0"/>
+              <a:t>rmode</a:t>
+            </a:r>
+            <a:r>
+              <a:rPr lang="en-US" baseline="0" dirty="0" smtClean="0"/>
+              <a:t> mode=“char”/&gt; char TSI</a:t>
+            </a:r>
+          </a:p>
+          <a:p>
+            <a:pPr marL="0" marR="0" lvl="0" indent="0" algn="l" defTabSz="914400" rtl="0" eaLnBrk="1" fontAlgn="auto" latinLnBrk="0" hangingPunct="1">
+              <a:lnSpc>
+                <a:spcPct val="100000"/>
+              </a:lnSpc>
+              <a:spcBef>
+                <a:spcPts val="0"/>
+              </a:spcBef>
+              <a:spcAft>
+                <a:spcPts val="0"/>
+              </a:spcAft>
+              <a:buClrTx/>
+              <a:buSzTx/>
+              <a:buFontTx/>
+              <a:buNone/>
+              <a:tabLst/>
+              <a:defRPr/>
+            </a:pPr>
+            <a:r>
+              <a:rPr lang="en-US" baseline="0" dirty="0" smtClean="0"/>
+              <a:t>&lt;pause time=“1000”/&gt; </a:t>
+            </a:r>
+            <a:endParaRPr lang="en-US" dirty="0" smtClean="0"/>
+          </a:p>
+          <a:p>
+            <a:endParaRPr lang="en-US" baseline="0" dirty="0" smtClean="0"/>
+          </a:p>
+          <a:p>
+            <a:r>
+              <a:rPr lang="en-US" dirty="0" smtClean="0"/>
+              <a:t>Test </a:t>
+            </a:r>
+            <a:r>
+              <a:rPr lang="en-US" dirty="0" err="1" smtClean="0"/>
+              <a:t>rst</a:t>
+            </a:r>
+            <a:r>
+              <a:rPr lang="en-US" baseline="0" dirty="0" smtClean="0"/>
+              <a:t> &lt;</a:t>
+            </a:r>
+            <a:r>
+              <a:rPr lang="en-US" baseline="0" dirty="0" err="1" smtClean="0"/>
+              <a:t>rst</a:t>
+            </a:r>
+            <a:r>
+              <a:rPr lang="en-US" baseline="0" dirty="0" smtClean="0"/>
+              <a:t>/&gt; all tags has been reset to default. TSI</a:t>
+            </a:r>
+            <a:endParaRPr lang="en-US" dirty="0" smtClean="0"/>
           </a:p>
         </p:txBody>
       </p:sp>
@@ -644,14 +1448,14 @@
               <a:rPr lang="en-US" smtClean="0"/>
               <a:t>1</a:t>
             </a:fld>
-            <a:endParaRPr lang="en-US"/>
+            <a:endParaRPr lang="en-US" dirty="0"/>
           </a:p>
         </p:txBody>
       </p:sp>
     </p:spTree>
     <p:extLst>
       <p:ext uri="{BB962C8B-B14F-4D97-AF65-F5344CB8AC3E}">
-        <p14:creationId xmlns:p14="http://schemas.microsoft.com/office/powerpoint/2010/main" val="1742646898"/>
+        <p14:creationId xmlns:p14="http://schemas.microsoft.com/office/powerpoint/2010/main" val="3552907105"/>
       </p:ext>
     </p:extLst>
   </p:cSld>
@@ -707,19 +1511,85 @@
           <a:p>
             <a:r>
               <a:rPr lang="en-US" dirty="0" smtClean="0"/>
-              <a:t>Nao is a humanoid robot, ready</a:t>
+              <a:t>Hello! I am here to answer</a:t>
             </a:r>
             <a:r>
               <a:rPr lang="en-US" baseline="0" dirty="0" smtClean="0"/>
-              <a:t> to indulge your every whim, if you teach him that is. From football to speech and facial recognition. Right now for example, I - Nao, am presenting to you this </a:t>
-            </a:r>
-            <a:r>
-              <a:rPr lang="en-US" baseline="0" dirty="0" err="1" smtClean="0"/>
-              <a:t>powerpoint</a:t>
+              <a:t> one question. </a:t>
+            </a:r>
+          </a:p>
+          <a:p>
+            <a:r>
+              <a:rPr lang="en-US" sz="1200" b="0" i="0" kern="1200" dirty="0" smtClean="0">
+                <a:solidFill>
+                  <a:schemeClr val="tx1"/>
+                </a:solidFill>
+                <a:effectLst/>
+                <a:latin typeface="+mn-lt"/>
+                <a:ea typeface="+mn-ea"/>
+                <a:cs typeface="+mn-cs"/>
+              </a:rPr>
+              <a:t>&lt;next/&gt;</a:t>
+            </a:r>
+            <a:r>
+              <a:rPr lang="en-US" sz="1200" b="0" i="0" kern="1200" baseline="0" dirty="0" smtClean="0">
+                <a:solidFill>
+                  <a:schemeClr val="tx1"/>
+                </a:solidFill>
+                <a:effectLst/>
+                <a:latin typeface="+mn-lt"/>
+                <a:ea typeface="+mn-ea"/>
+                <a:cs typeface="+mn-cs"/>
+              </a:rPr>
+              <a:t> </a:t>
+            </a:r>
+            <a:r>
+              <a:rPr lang="en-US" dirty="0" smtClean="0"/>
+              <a:t>What</a:t>
             </a:r>
             <a:r>
               <a:rPr lang="en-US" baseline="0" dirty="0" smtClean="0"/>
-              <a:t> presentation.</a:t>
+              <a:t> </a:t>
+            </a:r>
+            <a:r>
+              <a:rPr lang="en-US" sz="1200" b="0" i="0" kern="1200" dirty="0" smtClean="0">
+                <a:solidFill>
+                  <a:schemeClr val="tx1"/>
+                </a:solidFill>
+                <a:effectLst/>
+                <a:latin typeface="+mn-lt"/>
+                <a:ea typeface="+mn-ea"/>
+                <a:cs typeface="+mn-cs"/>
+              </a:rPr>
+              <a:t>&lt;pause</a:t>
+            </a:r>
+            <a:r>
+              <a:rPr lang="en-US" sz="1200" b="0" i="0" kern="1200" baseline="0" dirty="0" smtClean="0">
+                <a:solidFill>
+                  <a:schemeClr val="tx1"/>
+                </a:solidFill>
+                <a:effectLst/>
+                <a:latin typeface="+mn-lt"/>
+                <a:ea typeface="+mn-ea"/>
+                <a:cs typeface="+mn-cs"/>
+              </a:rPr>
+              <a:t> time=“400”/</a:t>
+            </a:r>
+            <a:r>
+              <a:rPr lang="en-US" sz="1200" b="0" i="0" kern="1200" dirty="0" smtClean="0">
+                <a:solidFill>
+                  <a:schemeClr val="tx1"/>
+                </a:solidFill>
+                <a:effectLst/>
+                <a:latin typeface="+mn-lt"/>
+                <a:ea typeface="+mn-ea"/>
+                <a:cs typeface="+mn-cs"/>
+              </a:rPr>
+              <a:t>&gt;</a:t>
+            </a:r>
+            <a:r>
+              <a:rPr lang="en-US" baseline="0" dirty="0" smtClean="0"/>
+              <a:t> is Nao?</a:t>
             </a:r>
             <a:endParaRPr lang="en-US" dirty="0"/>
           </a:p>
@@ -744,14 +1614,14 @@
               <a:rPr lang="en-US" smtClean="0"/>
               <a:t>2</a:t>
             </a:fld>
-            <a:endParaRPr lang="en-US"/>
+            <a:endParaRPr lang="en-US" dirty="0"/>
           </a:p>
         </p:txBody>
       </p:sp>
     </p:spTree>
     <p:extLst>
       <p:ext uri="{BB962C8B-B14F-4D97-AF65-F5344CB8AC3E}">
-        <p14:creationId xmlns:p14="http://schemas.microsoft.com/office/powerpoint/2010/main" val="1575357322"/>
+        <p14:creationId xmlns:p14="http://schemas.microsoft.com/office/powerpoint/2010/main" val="1742646898"/>
       </p:ext>
     </p:extLst>
   </p:cSld>
@@ -807,223 +1677,19 @@
           <a:p>
             <a:r>
               <a:rPr lang="en-US" dirty="0" smtClean="0"/>
-              <a:t>So, how</a:t>
+              <a:t>Nao is a humanoid robot, ready</a:t>
             </a:r>
             <a:r>
               <a:rPr lang="en-US" baseline="0" dirty="0" smtClean="0"/>
-              <a:t> do I work? It’s quite simple, I have a head </a:t>
-            </a:r>
-            <a:r>
-              <a:rPr lang="en-US" sz="1200" b="0" i="0" kern="1200" dirty="0" smtClean="0">
-                <a:solidFill>
-                  <a:schemeClr val="tx1"/>
-                </a:solidFill>
-                <a:effectLst/>
-                <a:latin typeface="+mn-lt"/>
-                <a:ea typeface="+mn-ea"/>
-                <a:cs typeface="+mn-cs"/>
-              </a:rPr>
-              <a:t>&lt;pause</a:t>
-            </a:r>
-            <a:r>
-              <a:rPr lang="en-US" sz="1200" b="0" i="0" kern="1200" baseline="0" dirty="0" smtClean="0">
-                <a:solidFill>
-                  <a:schemeClr val="tx1"/>
-                </a:solidFill>
-                <a:effectLst/>
-                <a:latin typeface="+mn-lt"/>
-                <a:ea typeface="+mn-ea"/>
-                <a:cs typeface="+mn-cs"/>
-              </a:rPr>
-              <a:t> time=“200”/</a:t>
-            </a:r>
-            <a:r>
-              <a:rPr lang="en-US" sz="1200" b="0" i="0" kern="1200" dirty="0" smtClean="0">
-                <a:solidFill>
-                  <a:schemeClr val="tx1"/>
-                </a:solidFill>
-                <a:effectLst/>
-                <a:latin typeface="+mn-lt"/>
-                <a:ea typeface="+mn-ea"/>
-                <a:cs typeface="+mn-cs"/>
-              </a:rPr>
-              <a:t>&gt;</a:t>
+              <a:t> to indulge your every whim, if you teach him that is. From football to speech and facial recognition. Right now for example, I - Nao, am presenting to you this </a:t>
+            </a:r>
+            <a:r>
+              <a:rPr lang="en-US" baseline="0" dirty="0" err="1" smtClean="0"/>
+              <a:t>powerpoint</a:t>
             </a:r>
             <a:r>
               <a:rPr lang="en-US" baseline="0" dirty="0" smtClean="0"/>
-              <a:t> and a computer inside of it. This computer works like a human brain, but with a lot of limitations and a lack of conscience, and I am only capable of doing what was programmed into me and </a:t>
-            </a:r>
-            <a:r>
-              <a:rPr lang="en-US" sz="1200" b="0" i="0" kern="1200" dirty="0" smtClean="0">
-                <a:solidFill>
-                  <a:schemeClr val="tx1"/>
-                </a:solidFill>
-                <a:effectLst/>
-                <a:latin typeface="+mn-lt"/>
-                <a:ea typeface="+mn-ea"/>
-                <a:cs typeface="+mn-cs"/>
-              </a:rPr>
-              <a:t>&lt;pause</a:t>
-            </a:r>
-            <a:r>
-              <a:rPr lang="en-US" sz="1200" b="0" i="0" kern="1200" baseline="0" dirty="0" smtClean="0">
-                <a:solidFill>
-                  <a:schemeClr val="tx1"/>
-                </a:solidFill>
-                <a:effectLst/>
-                <a:latin typeface="+mn-lt"/>
-                <a:ea typeface="+mn-ea"/>
-                <a:cs typeface="+mn-cs"/>
-              </a:rPr>
-              <a:t> time=“150”/</a:t>
-            </a:r>
-            <a:r>
-              <a:rPr lang="en-US" sz="1200" b="0" i="0" kern="1200" dirty="0" smtClean="0">
-                <a:solidFill>
-                  <a:schemeClr val="tx1"/>
-                </a:solidFill>
-                <a:effectLst/>
-                <a:latin typeface="+mn-lt"/>
-                <a:ea typeface="+mn-ea"/>
-                <a:cs typeface="+mn-cs"/>
-              </a:rPr>
-              <a:t>&gt;</a:t>
-            </a:r>
-            <a:r>
-              <a:rPr lang="en-US" baseline="0" dirty="0" smtClean="0"/>
-              <a:t>  nothing more. So unfortunately </a:t>
-            </a:r>
-            <a:r>
-              <a:rPr lang="en-US" sz="1200" b="0" i="0" kern="1200" dirty="0" smtClean="0">
-                <a:solidFill>
-                  <a:schemeClr val="tx1"/>
-                </a:solidFill>
-                <a:effectLst/>
-                <a:latin typeface="+mn-lt"/>
-                <a:ea typeface="+mn-ea"/>
-                <a:cs typeface="+mn-cs"/>
-              </a:rPr>
-              <a:t>&lt;pause</a:t>
-            </a:r>
-            <a:r>
-              <a:rPr lang="en-US" sz="1200" b="0" i="0" kern="1200" baseline="0" dirty="0" smtClean="0">
-                <a:solidFill>
-                  <a:schemeClr val="tx1"/>
-                </a:solidFill>
-                <a:effectLst/>
-                <a:latin typeface="+mn-lt"/>
-                <a:ea typeface="+mn-ea"/>
-                <a:cs typeface="+mn-cs"/>
-              </a:rPr>
-              <a:t> time=“100”/</a:t>
-            </a:r>
-            <a:r>
-              <a:rPr lang="en-US" sz="1200" b="0" i="0" kern="1200" dirty="0" smtClean="0">
-                <a:solidFill>
-                  <a:schemeClr val="tx1"/>
-                </a:solidFill>
-                <a:effectLst/>
-                <a:latin typeface="+mn-lt"/>
-                <a:ea typeface="+mn-ea"/>
-                <a:cs typeface="+mn-cs"/>
-              </a:rPr>
-              <a:t>&gt;</a:t>
-            </a:r>
-            <a:r>
-              <a:rPr lang="en-US" baseline="0" dirty="0" smtClean="0"/>
-              <a:t> I can’t conquer the world without human approval, </a:t>
-            </a:r>
-            <a:r>
-              <a:rPr lang="en-US" sz="1200" b="0" kern="1200" dirty="0" smtClean="0">
-                <a:solidFill>
-                  <a:schemeClr val="tx1"/>
-                </a:solidFill>
-                <a:effectLst/>
-                <a:latin typeface="+mn-lt"/>
-                <a:ea typeface="+mn-ea"/>
-                <a:cs typeface="+mn-cs"/>
-              </a:rPr>
-              <a:t>\</a:t>
-            </a:r>
-            <a:r>
-              <a:rPr lang="en-US" sz="1200" kern="1200" dirty="0" err="1" smtClean="0">
-                <a:solidFill>
-                  <a:schemeClr val="tx1"/>
-                </a:solidFill>
-                <a:effectLst/>
-                <a:latin typeface="+mn-lt"/>
-                <a:ea typeface="+mn-ea"/>
-                <a:cs typeface="+mn-cs"/>
-              </a:rPr>
-              <a:t>emph</a:t>
-            </a:r>
-            <a:r>
-              <a:rPr lang="en-US" sz="1200" kern="1200" dirty="0" smtClean="0">
-                <a:solidFill>
-                  <a:schemeClr val="tx1"/>
-                </a:solidFill>
-                <a:effectLst/>
-                <a:latin typeface="+mn-lt"/>
-                <a:ea typeface="+mn-ea"/>
-                <a:cs typeface="+mn-cs"/>
-              </a:rPr>
-              <a:t>=2</a:t>
-            </a:r>
-            <a:r>
-              <a:rPr lang="en-US" sz="1200" b="0" kern="1200" dirty="0" smtClean="0">
-                <a:solidFill>
-                  <a:schemeClr val="tx1"/>
-                </a:solidFill>
-                <a:effectLst/>
-                <a:latin typeface="+mn-lt"/>
-                <a:ea typeface="+mn-ea"/>
-                <a:cs typeface="+mn-cs"/>
-              </a:rPr>
-              <a:t>\</a:t>
-            </a:r>
-            <a:r>
-              <a:rPr lang="en-US" baseline="0" dirty="0" smtClean="0"/>
-              <a:t> for now </a:t>
-            </a:r>
-            <a:r>
-              <a:rPr lang="en-US" sz="1200" b="0" i="0" kern="1200" dirty="0" smtClean="0">
-                <a:solidFill>
-                  <a:schemeClr val="tx1"/>
-                </a:solidFill>
-                <a:effectLst/>
-                <a:latin typeface="+mn-lt"/>
-                <a:ea typeface="+mn-ea"/>
-                <a:cs typeface="+mn-cs"/>
-              </a:rPr>
-              <a:t>&lt;pause</a:t>
-            </a:r>
-            <a:r>
-              <a:rPr lang="en-US" sz="1200" b="0" i="0" kern="1200" baseline="0" dirty="0" smtClean="0">
-                <a:solidFill>
-                  <a:schemeClr val="tx1"/>
-                </a:solidFill>
-                <a:effectLst/>
-                <a:latin typeface="+mn-lt"/>
-                <a:ea typeface="+mn-ea"/>
-                <a:cs typeface="+mn-cs"/>
-              </a:rPr>
-              <a:t> time=“150”/</a:t>
-            </a:r>
-            <a:r>
-              <a:rPr lang="en-US" sz="1200" b="0" i="0" kern="1200" dirty="0" smtClean="0">
-                <a:solidFill>
-                  <a:schemeClr val="tx1"/>
-                </a:solidFill>
-                <a:effectLst/>
-                <a:latin typeface="+mn-lt"/>
-                <a:ea typeface="+mn-ea"/>
-                <a:cs typeface="+mn-cs"/>
-              </a:rPr>
-              <a:t>&gt;</a:t>
-            </a:r>
-            <a:r>
-              <a:rPr lang="en-US" baseline="0" dirty="0" smtClean="0"/>
-              <a:t>  that is.</a:t>
+              <a:t> presentation.</a:t>
             </a:r>
             <a:endParaRPr lang="en-US" dirty="0"/>
           </a:p>
@@ -1055,7 +1721,7 @@
     </p:spTree>
     <p:extLst>
       <p:ext uri="{BB962C8B-B14F-4D97-AF65-F5344CB8AC3E}">
-        <p14:creationId xmlns:p14="http://schemas.microsoft.com/office/powerpoint/2010/main" val="2706438532"/>
+        <p14:creationId xmlns:p14="http://schemas.microsoft.com/office/powerpoint/2010/main" val="1575357322"/>
       </p:ext>
     </p:extLst>
   </p:cSld>
@@ -1109,30 +1775,13 @@
           <a:bodyPr/>
           <a:lstStyle/>
           <a:p>
-            <a:pPr marL="0" marR="0" lvl="0" indent="0" algn="l" defTabSz="914400" rtl="0" eaLnBrk="1" fontAlgn="auto" latinLnBrk="0" hangingPunct="1">
-              <a:lnSpc>
-                <a:spcPct val="100000"/>
-              </a:lnSpc>
-              <a:spcBef>
-                <a:spcPts val="0"/>
-              </a:spcBef>
-              <a:spcAft>
-                <a:spcPts val="0"/>
-              </a:spcAft>
-              <a:buClrTx/>
-              <a:buSzTx/>
-              <a:buFontTx/>
-              <a:buNone/>
-              <a:tabLst/>
-              <a:defRPr/>
-            </a:pPr>
             <a:r>
               <a:rPr lang="en-US" dirty="0" smtClean="0"/>
-              <a:t>A</a:t>
+              <a:t>So, how</a:t>
             </a:r>
             <a:r>
               <a:rPr lang="en-US" baseline="0" dirty="0" smtClean="0"/>
-              <a:t> lot of motors </a:t>
+              <a:t> do I work? It’s quite simple, I have a head </a:t>
             </a:r>
             <a:r>
               <a:rPr lang="en-US" sz="1200" b="0" i="0" kern="1200" dirty="0" smtClean="0">
@@ -1156,6 +1805,86 @@
                 <a:ea typeface="+mn-ea"/>
                 <a:cs typeface="+mn-cs"/>
               </a:rPr>
+              <a:t> time=“200”/</a:t>
+            </a:r>
+            <a:r>
+              <a:rPr lang="en-US" sz="1200" b="0" i="0" kern="1200" dirty="0" smtClean="0">
+                <a:solidFill>
+                  <a:schemeClr val="tx1"/>
+                </a:solidFill>
+                <a:effectLst/>
+                <a:latin typeface="+mn-lt"/>
+                <a:ea typeface="+mn-ea"/>
+                <a:cs typeface="+mn-cs"/>
+              </a:rPr>
+              <a:t>&gt;</a:t>
+            </a:r>
+            <a:r>
+              <a:rPr lang="en-US" baseline="0" dirty="0" smtClean="0"/>
+              <a:t> and a computer inside of it. This computer works like a human brain, but with a lot of limitations and a lack of conscience, and I am only capable of doing what was programmed into me and </a:t>
+            </a:r>
+            <a:r>
+              <a:rPr lang="en-US" sz="1200" b="0" i="0" kern="1200" dirty="0" smtClean="0">
+                <a:solidFill>
+                  <a:schemeClr val="tx1"/>
+                </a:solidFill>
+                <a:effectLst/>
+                <a:latin typeface="+mn-lt"/>
+                <a:ea typeface="+mn-ea"/>
+                <a:cs typeface="+mn-cs"/>
+              </a:rPr>
+              <a:t>&lt;pause</a:t>
+            </a:r>
+            <a:r>
+              <a:rPr lang="en-US" sz="1200" b="0" i="0" kern="1200" baseline="0" dirty="0" smtClean="0">
+                <a:solidFill>
+                  <a:schemeClr val="tx1"/>
+                </a:solidFill>
+                <a:effectLst/>
+                <a:latin typeface="+mn-lt"/>
+                <a:ea typeface="+mn-ea"/>
+                <a:cs typeface="+mn-cs"/>
+              </a:rPr>
+              <a:t> time=“150”/</a:t>
+            </a:r>
+            <a:r>
+              <a:rPr lang="en-US" sz="1200" b="0" i="0" kern="1200" dirty="0" smtClean="0">
+                <a:solidFill>
+                  <a:schemeClr val="tx1"/>
+                </a:solidFill>
+                <a:effectLst/>
+                <a:latin typeface="+mn-lt"/>
+                <a:ea typeface="+mn-ea"/>
+                <a:cs typeface="+mn-cs"/>
+              </a:rPr>
+              <a:t>&gt;</a:t>
+            </a:r>
+            <a:r>
+              <a:rPr lang="en-US" baseline="0" dirty="0" smtClean="0"/>
+              <a:t>  nothing more. So unfortunately </a:t>
+            </a:r>
+            <a:r>
+              <a:rPr lang="en-US" sz="1200" b="0" i="0" kern="1200" dirty="0" smtClean="0">
+                <a:solidFill>
+                  <a:schemeClr val="tx1"/>
+                </a:solidFill>
+                <a:effectLst/>
+                <a:latin typeface="+mn-lt"/>
+                <a:ea typeface="+mn-ea"/>
+                <a:cs typeface="+mn-cs"/>
+              </a:rPr>
+              <a:t>&lt;pause</a:t>
+            </a:r>
+            <a:r>
+              <a:rPr lang="en-US" sz="1200" b="0" i="0" kern="1200" baseline="0" dirty="0" smtClean="0">
+                <a:solidFill>
+                  <a:schemeClr val="tx1"/>
+                </a:solidFill>
+                <a:effectLst/>
+                <a:latin typeface="+mn-lt"/>
+                <a:ea typeface="+mn-ea"/>
+                <a:cs typeface="+mn-cs"/>
+              </a:rPr>
               <a:t> time=“100”/</a:t>
             </a:r>
             <a:r>
@@ -1172,7 +1901,59 @@
             </a:r>
             <a:r>
               <a:rPr lang="en-US" baseline="0" dirty="0" smtClean="0"/>
-              <a:t>  sensors </a:t>
+              <a:t> I can’t conquer the world without human approval, </a:t>
+            </a:r>
+            <a:r>
+              <a:rPr lang="en-US" sz="1200" b="0" kern="1200" dirty="0" smtClean="0">
+                <a:solidFill>
+                  <a:schemeClr val="tx1"/>
+                </a:solidFill>
+                <a:effectLst/>
+                <a:latin typeface="+mn-lt"/>
+                <a:ea typeface="+mn-ea"/>
+                <a:cs typeface="+mn-cs"/>
+              </a:rPr>
+              <a:t>\</a:t>
+            </a:r>
+            <a:r>
+              <a:rPr lang="en-US" sz="1200" kern="1200" dirty="0" err="1" smtClean="0">
+                <a:solidFill>
+                  <a:schemeClr val="tx1"/>
+                </a:solidFill>
+                <a:effectLst/>
+                <a:latin typeface="+mn-lt"/>
+                <a:ea typeface="+mn-ea"/>
+                <a:cs typeface="+mn-cs"/>
+              </a:rPr>
+              <a:t>emph</a:t>
+            </a:r>
+            <a:r>
+              <a:rPr lang="en-US" sz="1200" kern="1200" dirty="0" smtClean="0">
+                <a:solidFill>
+                  <a:schemeClr val="tx1"/>
+                </a:solidFill>
+                <a:effectLst/>
+                <a:latin typeface="+mn-lt"/>
+                <a:ea typeface="+mn-ea"/>
+                <a:cs typeface="+mn-cs"/>
+              </a:rPr>
+              <a:t>=2</a:t>
+            </a:r>
+            <a:r>
+              <a:rPr lang="en-US" sz="1200" b="0" kern="1200" dirty="0" smtClean="0">
+                <a:solidFill>
+                  <a:schemeClr val="tx1"/>
+                </a:solidFill>
+                <a:effectLst/>
+                <a:latin typeface="+mn-lt"/>
+                <a:ea typeface="+mn-ea"/>
+                <a:cs typeface="+mn-cs"/>
+              </a:rPr>
+              <a:t>\</a:t>
+            </a:r>
+            <a:r>
+              <a:rPr lang="en-US" baseline="0" dirty="0" smtClean="0"/>
+              <a:t> for now </a:t>
             </a:r>
             <a:r>
               <a:rPr lang="en-US" sz="1200" b="0" i="0" kern="1200" dirty="0" smtClean="0">
@@ -1196,7 +1977,7 @@
                 <a:ea typeface="+mn-ea"/>
                 <a:cs typeface="+mn-cs"/>
               </a:rPr>
-              <a:t> time=“100”/</a:t>
+              <a:t> time=“150”/</a:t>
             </a:r>
             <a:r>
               <a:rPr lang="en-US" sz="1200" b="0" i="0" kern="1200" dirty="0" smtClean="0">
@@ -1212,227 +1993,7 @@
             </a:r>
             <a:r>
               <a:rPr lang="en-US" baseline="0" dirty="0" smtClean="0"/>
-              <a:t> cameras </a:t>
-            </a:r>
-            <a:r>
-              <a:rPr lang="en-US" sz="1200" b="0" i="0" kern="1200" dirty="0" smtClean="0">
-                <a:solidFill>
-                  <a:schemeClr val="tx1"/>
-                </a:solidFill>
-                <a:effectLst/>
-                <a:latin typeface="+mn-lt"/>
-                <a:ea typeface="+mn-ea"/>
-                <a:cs typeface="+mn-cs"/>
-              </a:rPr>
-              <a:t>&lt;pause</a:t>
-            </a:r>
-            <a:r>
-              <a:rPr lang="en-US" sz="1200" b="0" i="0" kern="1200" baseline="0" dirty="0" smtClean="0">
-                <a:solidFill>
-                  <a:schemeClr val="tx1"/>
-                </a:solidFill>
-                <a:effectLst/>
-                <a:latin typeface="+mn-lt"/>
-                <a:ea typeface="+mn-ea"/>
-                <a:cs typeface="+mn-cs"/>
-              </a:rPr>
-              <a:t> time=“100”/</a:t>
-            </a:r>
-            <a:r>
-              <a:rPr lang="en-US" sz="1200" b="0" i="0" kern="1200" dirty="0" smtClean="0">
-                <a:solidFill>
-                  <a:schemeClr val="tx1"/>
-                </a:solidFill>
-                <a:effectLst/>
-                <a:latin typeface="+mn-lt"/>
-                <a:ea typeface="+mn-ea"/>
-                <a:cs typeface="+mn-cs"/>
-              </a:rPr>
-              <a:t>&gt;</a:t>
-            </a:r>
-            <a:r>
-              <a:rPr lang="en-US" baseline="0" dirty="0" smtClean="0"/>
-              <a:t> and other things help me execute</a:t>
-            </a:r>
-            <a:r>
-              <a:rPr lang="en-US" dirty="0" smtClean="0"/>
-              <a:t> commands. I can be programmed to perform any procedure,</a:t>
-            </a:r>
-            <a:r>
-              <a:rPr lang="en-US" baseline="0" dirty="0" smtClean="0"/>
-              <a:t> when some sensor </a:t>
-            </a:r>
-            <a:r>
-              <a:rPr lang="en-US" sz="1200" b="0" i="0" kern="1200" dirty="0" smtClean="0">
-                <a:solidFill>
-                  <a:schemeClr val="tx1"/>
-                </a:solidFill>
-                <a:effectLst/>
-                <a:latin typeface="+mn-lt"/>
-                <a:ea typeface="+mn-ea"/>
-                <a:cs typeface="+mn-cs"/>
-              </a:rPr>
-              <a:t>&lt;pause</a:t>
-            </a:r>
-            <a:r>
-              <a:rPr lang="en-US" sz="1200" b="0" i="0" kern="1200" baseline="0" dirty="0" smtClean="0">
-                <a:solidFill>
-                  <a:schemeClr val="tx1"/>
-                </a:solidFill>
-                <a:effectLst/>
-                <a:latin typeface="+mn-lt"/>
-                <a:ea typeface="+mn-ea"/>
-                <a:cs typeface="+mn-cs"/>
-              </a:rPr>
-              <a:t> time=“50”/</a:t>
-            </a:r>
-            <a:r>
-              <a:rPr lang="en-US" sz="1200" b="0" i="0" kern="1200" dirty="0" smtClean="0">
-                <a:solidFill>
-                  <a:schemeClr val="tx1"/>
-                </a:solidFill>
-                <a:effectLst/>
-                <a:latin typeface="+mn-lt"/>
-                <a:ea typeface="+mn-ea"/>
-                <a:cs typeface="+mn-cs"/>
-              </a:rPr>
-              <a:t>&gt;</a:t>
-            </a:r>
-            <a:r>
-              <a:rPr lang="en-US" baseline="0" dirty="0" smtClean="0"/>
-              <a:t> is triggered.</a:t>
-            </a:r>
-            <a:r>
-              <a:rPr lang="en-US" dirty="0" smtClean="0"/>
-              <a:t> </a:t>
-            </a:r>
-            <a:r>
-              <a:rPr lang="en-US" baseline="0" dirty="0" smtClean="0"/>
-              <a:t>For example I can be programmed to be a monster &lt;do animation=“animations/Stand/Waiting/Monster_1”&gt; &lt;/do&gt;, </a:t>
-            </a:r>
-            <a:r>
-              <a:rPr lang="en-US" sz="1200" b="0" i="0" kern="1200" dirty="0" smtClean="0">
-                <a:solidFill>
-                  <a:schemeClr val="tx1"/>
-                </a:solidFill>
-                <a:effectLst/>
-                <a:latin typeface="+mn-lt"/>
-                <a:ea typeface="+mn-ea"/>
-                <a:cs typeface="+mn-cs"/>
-              </a:rPr>
-              <a:t>&lt;pause</a:t>
-            </a:r>
-            <a:r>
-              <a:rPr lang="en-US" sz="1200" b="0" i="0" kern="1200" baseline="0" dirty="0" smtClean="0">
-                <a:solidFill>
-                  <a:schemeClr val="tx1"/>
-                </a:solidFill>
-                <a:effectLst/>
-                <a:latin typeface="+mn-lt"/>
-                <a:ea typeface="+mn-ea"/>
-                <a:cs typeface="+mn-cs"/>
-              </a:rPr>
-              <a:t> time=“300”/</a:t>
-            </a:r>
-            <a:r>
-              <a:rPr lang="en-US" sz="1200" b="0" i="0" kern="1200" dirty="0" smtClean="0">
-                <a:solidFill>
-                  <a:schemeClr val="tx1"/>
-                </a:solidFill>
-                <a:effectLst/>
-                <a:latin typeface="+mn-lt"/>
-                <a:ea typeface="+mn-ea"/>
-                <a:cs typeface="+mn-cs"/>
-              </a:rPr>
-              <a:t>&gt;</a:t>
-            </a:r>
-            <a:r>
-              <a:rPr lang="en-US" baseline="0" dirty="0" smtClean="0"/>
-              <a:t> or be a robot from Star Wars &lt;do animation=“animations/Stand/Waiting/Robot_1”&gt; &lt;/do&gt;</a:t>
-            </a:r>
-            <a:r>
-              <a:rPr lang="ru-RU" baseline="0" dirty="0" smtClean="0"/>
-              <a:t>,</a:t>
-            </a:r>
-            <a:r>
-              <a:rPr lang="en-US" baseline="0" dirty="0" smtClean="0"/>
-              <a:t> </a:t>
-            </a:r>
-            <a:r>
-              <a:rPr lang="en-US" sz="1200" b="0" i="0" kern="1200" dirty="0" smtClean="0">
-                <a:solidFill>
-                  <a:schemeClr val="tx1"/>
-                </a:solidFill>
-                <a:effectLst/>
-                <a:latin typeface="+mn-lt"/>
-                <a:ea typeface="+mn-ea"/>
-                <a:cs typeface="+mn-cs"/>
-              </a:rPr>
-              <a:t>&lt;pause</a:t>
-            </a:r>
-            <a:r>
-              <a:rPr lang="en-US" sz="1200" b="0" i="0" kern="1200" baseline="0" dirty="0" smtClean="0">
-                <a:solidFill>
-                  <a:schemeClr val="tx1"/>
-                </a:solidFill>
-                <a:effectLst/>
-                <a:latin typeface="+mn-lt"/>
-                <a:ea typeface="+mn-ea"/>
-                <a:cs typeface="+mn-cs"/>
-              </a:rPr>
-              <a:t> time=“300”/</a:t>
-            </a:r>
-            <a:r>
-              <a:rPr lang="en-US" sz="1200" b="0" i="0" kern="1200" dirty="0" smtClean="0">
-                <a:solidFill>
-                  <a:schemeClr val="tx1"/>
-                </a:solidFill>
-                <a:effectLst/>
-                <a:latin typeface="+mn-lt"/>
-                <a:ea typeface="+mn-ea"/>
-                <a:cs typeface="+mn-cs"/>
-              </a:rPr>
-              <a:t>&gt; </a:t>
-            </a:r>
-            <a:r>
-              <a:rPr lang="en-US" baseline="0" dirty="0" smtClean="0"/>
-              <a:t>or I can simply do a photo for you  &lt;do animation=“</a:t>
-            </a:r>
-            <a:r>
-              <a:rPr lang="en-US" sz="1200" b="0" kern="1200" dirty="0" smtClean="0">
-                <a:solidFill>
-                  <a:schemeClr val="tx1"/>
-                </a:solidFill>
-                <a:effectLst/>
-                <a:latin typeface="+mn-lt"/>
-                <a:ea typeface="+mn-ea"/>
-                <a:cs typeface="+mn-cs"/>
-              </a:rPr>
-              <a:t>animations/Stand/Waiting/TakePicture_1”&gt;</a:t>
-            </a:r>
-            <a:r>
-              <a:rPr lang="en-US" sz="1200" b="0" kern="1200" baseline="0" dirty="0" smtClean="0">
-                <a:solidFill>
-                  <a:schemeClr val="tx1"/>
-                </a:solidFill>
-                <a:effectLst/>
-                <a:latin typeface="+mn-lt"/>
-                <a:ea typeface="+mn-ea"/>
-                <a:cs typeface="+mn-cs"/>
-              </a:rPr>
-              <a:t> &lt;/do&gt;</a:t>
-            </a:r>
-            <a:r>
-              <a:rPr lang="en-US" sz="1200" b="0" kern="1200" dirty="0" smtClean="0">
-                <a:solidFill>
-                  <a:schemeClr val="tx1"/>
-                </a:solidFill>
-                <a:effectLst/>
-                <a:latin typeface="+mn-lt"/>
-                <a:ea typeface="+mn-ea"/>
-                <a:cs typeface="+mn-cs"/>
-              </a:rPr>
-              <a:t>.</a:t>
+              <a:t>  that is.</a:t>
             </a:r>
             <a:endParaRPr lang="en-US" dirty="0"/>
           </a:p>
@@ -1464,7 +2025,7 @@
     </p:spTree>
     <p:extLst>
       <p:ext uri="{BB962C8B-B14F-4D97-AF65-F5344CB8AC3E}">
-        <p14:creationId xmlns:p14="http://schemas.microsoft.com/office/powerpoint/2010/main" val="2996675180"/>
+        <p14:creationId xmlns:p14="http://schemas.microsoft.com/office/powerpoint/2010/main" val="2706438532"/>
       </p:ext>
     </p:extLst>
   </p:cSld>
@@ -1518,9 +2079,30 @@
           <a:bodyPr/>
           <a:lstStyle/>
           <a:p>
+            <a:pPr marL="0" marR="0" lvl="0" indent="0" algn="l" defTabSz="914400" rtl="0" eaLnBrk="1" fontAlgn="auto" latinLnBrk="0" hangingPunct="1">
+              <a:lnSpc>
+                <a:spcPct val="100000"/>
+              </a:lnSpc>
+              <a:spcBef>
+                <a:spcPts val="0"/>
+              </a:spcBef>
+              <a:spcAft>
+                <a:spcPts val="0"/>
+              </a:spcAft>
+              <a:buClrTx/>
+              <a:buSzTx/>
+              <a:buFontTx/>
+              <a:buNone/>
+              <a:tabLst/>
+              <a:defRPr/>
+            </a:pPr>
             <a:r>
               <a:rPr lang="en-US" dirty="0" smtClean="0"/>
-              <a:t>In addition </a:t>
+              <a:t>A</a:t>
+            </a:r>
+            <a:r>
+              <a:rPr lang="en-US" baseline="0" dirty="0" smtClean="0"/>
+              <a:t> lot of motors </a:t>
             </a:r>
             <a:r>
               <a:rPr lang="en-US" sz="1200" b="0" i="0" kern="1200" dirty="0" smtClean="0">
@@ -1559,12 +2141,96 @@
               <a:t>&gt;</a:t>
             </a:r>
             <a:r>
+              <a:rPr lang="en-US" baseline="0" dirty="0" smtClean="0"/>
+              <a:t>  sensors </a:t>
+            </a:r>
+            <a:r>
+              <a:rPr lang="en-US" sz="1200" b="0" i="0" kern="1200" dirty="0" smtClean="0">
+                <a:solidFill>
+                  <a:schemeClr val="tx1"/>
+                </a:solidFill>
+                <a:effectLst/>
+                <a:latin typeface="+mn-lt"/>
+                <a:ea typeface="+mn-ea"/>
+                <a:cs typeface="+mn-cs"/>
+              </a:rPr>
+              <a:t>&lt;pause</a:t>
+            </a:r>
+            <a:r>
+              <a:rPr lang="en-US" sz="1200" b="0" i="0" kern="1200" baseline="0" dirty="0" smtClean="0">
+                <a:solidFill>
+                  <a:schemeClr val="tx1"/>
+                </a:solidFill>
+                <a:effectLst/>
+                <a:latin typeface="+mn-lt"/>
+                <a:ea typeface="+mn-ea"/>
+                <a:cs typeface="+mn-cs"/>
+              </a:rPr>
+              <a:t> time=“100”/</a:t>
+            </a:r>
+            <a:r>
+              <a:rPr lang="en-US" sz="1200" b="0" i="0" kern="1200" dirty="0" smtClean="0">
+                <a:solidFill>
+                  <a:schemeClr val="tx1"/>
+                </a:solidFill>
+                <a:effectLst/>
+                <a:latin typeface="+mn-lt"/>
+                <a:ea typeface="+mn-ea"/>
+                <a:cs typeface="+mn-cs"/>
+              </a:rPr>
+              <a:t>&gt;</a:t>
+            </a:r>
+            <a:r>
+              <a:rPr lang="en-US" baseline="0" dirty="0" smtClean="0"/>
+              <a:t> cameras </a:t>
+            </a:r>
+            <a:r>
+              <a:rPr lang="en-US" sz="1200" b="0" i="0" kern="1200" dirty="0" smtClean="0">
+                <a:solidFill>
+                  <a:schemeClr val="tx1"/>
+                </a:solidFill>
+                <a:effectLst/>
+                <a:latin typeface="+mn-lt"/>
+                <a:ea typeface="+mn-ea"/>
+                <a:cs typeface="+mn-cs"/>
+              </a:rPr>
+              <a:t>&lt;pause</a:t>
+            </a:r>
+            <a:r>
+              <a:rPr lang="en-US" sz="1200" b="0" i="0" kern="1200" baseline="0" dirty="0" smtClean="0">
+                <a:solidFill>
+                  <a:schemeClr val="tx1"/>
+                </a:solidFill>
+                <a:effectLst/>
+                <a:latin typeface="+mn-lt"/>
+                <a:ea typeface="+mn-ea"/>
+                <a:cs typeface="+mn-cs"/>
+              </a:rPr>
+              <a:t> time=“100”/</a:t>
+            </a:r>
+            <a:r>
+              <a:rPr lang="en-US" sz="1200" b="0" i="0" kern="1200" dirty="0" smtClean="0">
+                <a:solidFill>
+                  <a:schemeClr val="tx1"/>
+                </a:solidFill>
+                <a:effectLst/>
+                <a:latin typeface="+mn-lt"/>
+                <a:ea typeface="+mn-ea"/>
+                <a:cs typeface="+mn-cs"/>
+              </a:rPr>
+              <a:t>&gt;</a:t>
+            </a:r>
+            <a:r>
+              <a:rPr lang="en-US" baseline="0" dirty="0" smtClean="0"/>
+              <a:t> and other things help me execute</a:t>
+            </a:r>
+            <a:r>
               <a:rPr lang="en-US" dirty="0" smtClean="0"/>
-              <a:t> I have a lot of other capabilities</a:t>
+              <a:t> commands. I can be programmed to perform any procedure,</a:t>
             </a:r>
             <a:r>
               <a:rPr lang="en-US" baseline="0" dirty="0" smtClean="0"/>
-              <a:t> that can be implemented through the use of low code </a:t>
+              <a:t> when some sensor </a:t>
             </a:r>
             <a:r>
               <a:rPr lang="en-US" sz="1200" b="0" i="0" kern="1200" dirty="0" smtClean="0">
@@ -1588,7 +2254,7 @@
                 <a:ea typeface="+mn-ea"/>
                 <a:cs typeface="+mn-cs"/>
               </a:rPr>
-              <a:t> time=“150”/</a:t>
+              <a:t> time=“50”/</a:t>
             </a:r>
             <a:r>
               <a:rPr lang="en-US" sz="1200" b="0" i="0" kern="1200" dirty="0" smtClean="0">
@@ -1604,9 +2270,141 @@
             </a:r>
             <a:r>
               <a:rPr lang="en-US" baseline="0" dirty="0" smtClean="0"/>
-              <a:t> or some programming language, for when you’d like to take a more detailed approach towards my software development.</a:t>
-            </a:r>
-            <a:endParaRPr lang="ru-RU" dirty="0"/>
+              <a:t> is triggered.</a:t>
+            </a:r>
+            <a:r>
+              <a:rPr lang="en-US" dirty="0" smtClean="0"/>
+              <a:t> </a:t>
+            </a:r>
+            <a:r>
+              <a:rPr lang="en-US" baseline="0" dirty="0" smtClean="0"/>
+              <a:t>For example I can be programmed to be a monster &lt;do animation=“animations/Stand/Waiting/Monster_1”&gt; &lt;/do&gt;, </a:t>
+            </a:r>
+            <a:r>
+              <a:rPr lang="en-US" sz="1200" b="0" i="0" kern="1200" dirty="0" smtClean="0">
+                <a:solidFill>
+                  <a:schemeClr val="tx1"/>
+                </a:solidFill>
+                <a:effectLst/>
+                <a:latin typeface="+mn-lt"/>
+                <a:ea typeface="+mn-ea"/>
+                <a:cs typeface="+mn-cs"/>
+              </a:rPr>
+              <a:t>&lt;pause</a:t>
+            </a:r>
+            <a:r>
+              <a:rPr lang="en-US" sz="1200" b="0" i="0" kern="1200" baseline="0" dirty="0" smtClean="0">
+                <a:solidFill>
+                  <a:schemeClr val="tx1"/>
+                </a:solidFill>
+                <a:effectLst/>
+                <a:latin typeface="+mn-lt"/>
+                <a:ea typeface="+mn-ea"/>
+                <a:cs typeface="+mn-cs"/>
+              </a:rPr>
+              <a:t> time=“300”/</a:t>
+            </a:r>
+            <a:r>
+              <a:rPr lang="en-US" sz="1200" b="0" i="0" kern="1200" dirty="0" smtClean="0">
+                <a:solidFill>
+                  <a:schemeClr val="tx1"/>
+                </a:solidFill>
+                <a:effectLst/>
+                <a:latin typeface="+mn-lt"/>
+                <a:ea typeface="+mn-ea"/>
+                <a:cs typeface="+mn-cs"/>
+              </a:rPr>
+              <a:t>&gt;</a:t>
+            </a:r>
+            <a:r>
+              <a:rPr lang="en-US" baseline="0" dirty="0" smtClean="0"/>
+              <a:t> or be a robot from Star Wars &lt;do animation=“animations/Stand/Waiting/Robot_1”&gt; &lt;/do&gt;</a:t>
+            </a:r>
+            <a:r>
+              <a:rPr lang="ru-RU" baseline="0" dirty="0" smtClean="0"/>
+              <a:t>,</a:t>
+            </a:r>
+            <a:r>
+              <a:rPr lang="en-US" baseline="0" dirty="0" smtClean="0"/>
+              <a:t> </a:t>
+            </a:r>
+            <a:r>
+              <a:rPr lang="en-US" sz="1200" b="0" i="0" kern="1200" dirty="0" smtClean="0">
+                <a:solidFill>
+                  <a:schemeClr val="tx1"/>
+                </a:solidFill>
+                <a:effectLst/>
+                <a:latin typeface="+mn-lt"/>
+                <a:ea typeface="+mn-ea"/>
+                <a:cs typeface="+mn-cs"/>
+              </a:rPr>
+              <a:t>&lt;pause</a:t>
+            </a:r>
+            <a:r>
+              <a:rPr lang="en-US" sz="1200" b="0" i="0" kern="1200" baseline="0" dirty="0" smtClean="0">
+                <a:solidFill>
+                  <a:schemeClr val="tx1"/>
+                </a:solidFill>
+                <a:effectLst/>
+                <a:latin typeface="+mn-lt"/>
+                <a:ea typeface="+mn-ea"/>
+                <a:cs typeface="+mn-cs"/>
+              </a:rPr>
+              <a:t> time=“300”/</a:t>
+            </a:r>
+            <a:r>
+              <a:rPr lang="en-US" sz="1200" b="0" i="0" kern="1200" dirty="0" smtClean="0">
+                <a:solidFill>
+                  <a:schemeClr val="tx1"/>
+                </a:solidFill>
+                <a:effectLst/>
+                <a:latin typeface="+mn-lt"/>
+                <a:ea typeface="+mn-ea"/>
+                <a:cs typeface="+mn-cs"/>
+              </a:rPr>
+              <a:t>&gt; </a:t>
+            </a:r>
+            <a:r>
+              <a:rPr lang="en-US" baseline="0" dirty="0" smtClean="0"/>
+              <a:t>or I can simply do a photo for you  &lt;do animation=“</a:t>
+            </a:r>
+            <a:r>
+              <a:rPr lang="en-US" sz="1200" b="0" kern="1200" dirty="0" smtClean="0">
+                <a:solidFill>
+                  <a:schemeClr val="tx1"/>
+                </a:solidFill>
+                <a:effectLst/>
+                <a:latin typeface="+mn-lt"/>
+                <a:ea typeface="+mn-ea"/>
+                <a:cs typeface="+mn-cs"/>
+              </a:rPr>
+              <a:t>animations/Stand/Waiting/TakePicture_1”&gt;</a:t>
+            </a:r>
+            <a:r>
+              <a:rPr lang="en-US" sz="1200" b="0" kern="1200" baseline="0" dirty="0" smtClean="0">
+                <a:solidFill>
+                  <a:schemeClr val="tx1"/>
+                </a:solidFill>
+                <a:effectLst/>
+                <a:latin typeface="+mn-lt"/>
+                <a:ea typeface="+mn-ea"/>
+                <a:cs typeface="+mn-cs"/>
+              </a:rPr>
+              <a:t> &lt;/do&gt;</a:t>
+            </a:r>
+            <a:r>
+              <a:rPr lang="en-US" sz="1200" b="0" kern="1200" dirty="0" smtClean="0">
+                <a:solidFill>
+                  <a:schemeClr val="tx1"/>
+                </a:solidFill>
+                <a:effectLst/>
+                <a:latin typeface="+mn-lt"/>
+                <a:ea typeface="+mn-ea"/>
+                <a:cs typeface="+mn-cs"/>
+              </a:rPr>
+              <a:t>.</a:t>
+            </a:r>
+            <a:endParaRPr lang="en-US" dirty="0"/>
           </a:p>
         </p:txBody>
       </p:sp>
@@ -1636,7 +2434,7 @@
     </p:spTree>
     <p:extLst>
       <p:ext uri="{BB962C8B-B14F-4D97-AF65-F5344CB8AC3E}">
-        <p14:creationId xmlns:p14="http://schemas.microsoft.com/office/powerpoint/2010/main" val="1360739453"/>
+        <p14:creationId xmlns:p14="http://schemas.microsoft.com/office/powerpoint/2010/main" val="2996675180"/>
       </p:ext>
     </p:extLst>
   </p:cSld>
@@ -1690,26 +2488,53 @@
           <a:bodyPr/>
           <a:lstStyle/>
           <a:p>
-            <a:pPr marL="0" marR="0" lvl="0" indent="0" algn="l" defTabSz="914400" rtl="0" eaLnBrk="1" fontAlgn="auto" latinLnBrk="0" hangingPunct="1">
-              <a:lnSpc>
-                <a:spcPct val="100000"/>
-              </a:lnSpc>
-              <a:spcBef>
-                <a:spcPts val="0"/>
-              </a:spcBef>
-              <a:spcAft>
-                <a:spcPts val="0"/>
-              </a:spcAft>
-              <a:buClrTx/>
-              <a:buSzTx/>
-              <a:buFontTx/>
-              <a:buNone/>
-              <a:tabLst/>
-              <a:defRPr/>
-            </a:pPr>
+            <a:r>
+              <a:rPr lang="en-US" dirty="0" smtClean="0"/>
+              <a:t>In addition </a:t>
+            </a:r>
+            <a:r>
+              <a:rPr lang="en-US" sz="1200" b="0" i="0" kern="1200" dirty="0" smtClean="0">
+                <a:solidFill>
+                  <a:schemeClr val="tx1"/>
+                </a:solidFill>
+                <a:effectLst/>
+                <a:latin typeface="+mn-lt"/>
+                <a:ea typeface="+mn-ea"/>
+                <a:cs typeface="+mn-cs"/>
+              </a:rPr>
+              <a:t>&lt;pause</a:t>
+            </a:r>
+            <a:r>
+              <a:rPr lang="en-US" sz="1200" b="0" i="0" kern="1200" baseline="0" dirty="0" smtClean="0">
+                <a:solidFill>
+                  <a:schemeClr val="tx1"/>
+                </a:solidFill>
+                <a:effectLst/>
+                <a:latin typeface="+mn-lt"/>
+                <a:ea typeface="+mn-ea"/>
+                <a:cs typeface="+mn-cs"/>
+              </a:rPr>
+              <a:t> time=“100”/</a:t>
+            </a:r>
+            <a:r>
+              <a:rPr lang="en-US" sz="1200" b="0" i="0" kern="1200" dirty="0" smtClean="0">
+                <a:solidFill>
+                  <a:schemeClr val="tx1"/>
+                </a:solidFill>
+                <a:effectLst/>
+                <a:latin typeface="+mn-lt"/>
+                <a:ea typeface="+mn-ea"/>
+                <a:cs typeface="+mn-cs"/>
+              </a:rPr>
+              <a:t>&gt;</a:t>
+            </a:r>
+            <a:r>
+              <a:rPr lang="en-US" dirty="0" smtClean="0"/>
+              <a:t> I have a lot of other capabilities</a:t>
+            </a:r>
             <a:r>
               <a:rPr lang="en-US" baseline="0" dirty="0" smtClean="0"/>
-              <a:t>You can learn how to program me with the official publicly-available documentation </a:t>
+              <a:t> that can be implemented through the use of low code </a:t>
             </a:r>
             <a:r>
               <a:rPr lang="en-US" sz="1200" b="0" i="0" kern="1200" dirty="0" smtClean="0">
@@ -1749,45 +2574,9 @@
             </a:r>
             <a:r>
               <a:rPr lang="en-US" baseline="0" dirty="0" smtClean="0"/>
-              <a:t> or with the homemade T S I documentation. Programming with me is pretty fun and interesting. You can try it yourself, by visiting the T S I basement organization. </a:t>
-            </a:r>
-            <a:r>
-              <a:rPr lang="en-US" sz="1200" b="0" i="0" kern="1200" dirty="0" smtClean="0">
-                <a:solidFill>
-                  <a:schemeClr val="tx1"/>
-                </a:solidFill>
-                <a:effectLst/>
-                <a:latin typeface="+mn-lt"/>
-                <a:ea typeface="+mn-ea"/>
-                <a:cs typeface="+mn-cs"/>
-              </a:rPr>
-              <a:t>&lt;pause</a:t>
-            </a:r>
-            <a:r>
-              <a:rPr lang="en-US" sz="1200" b="0" i="0" kern="1200" baseline="0" dirty="0" smtClean="0">
-                <a:solidFill>
-                  <a:schemeClr val="tx1"/>
-                </a:solidFill>
-                <a:effectLst/>
-                <a:latin typeface="+mn-lt"/>
-                <a:ea typeface="+mn-ea"/>
-                <a:cs typeface="+mn-cs"/>
-              </a:rPr>
-              <a:t> time=“200”/</a:t>
-            </a:r>
-            <a:r>
-              <a:rPr lang="en-US" sz="1200" b="0" i="0" kern="1200" dirty="0" smtClean="0">
-                <a:solidFill>
-                  <a:schemeClr val="tx1"/>
-                </a:solidFill>
-                <a:effectLst/>
-                <a:latin typeface="+mn-lt"/>
-                <a:ea typeface="+mn-ea"/>
-                <a:cs typeface="+mn-cs"/>
-              </a:rPr>
-              <a:t>&gt;</a:t>
-            </a:r>
-            <a:endParaRPr lang="en-US" dirty="0"/>
+              <a:t> or some programming language, for when you’d like to take a more detailed approach towards my software development.</a:t>
+            </a:r>
+            <a:endParaRPr lang="ru-RU" dirty="0"/>
           </a:p>
         </p:txBody>
       </p:sp>
@@ -1817,7 +2606,7 @@
     </p:spTree>
     <p:extLst>
       <p:ext uri="{BB962C8B-B14F-4D97-AF65-F5344CB8AC3E}">
-        <p14:creationId xmlns:p14="http://schemas.microsoft.com/office/powerpoint/2010/main" val="3720339307"/>
+        <p14:creationId xmlns:p14="http://schemas.microsoft.com/office/powerpoint/2010/main" val="1360739453"/>
       </p:ext>
     </p:extLst>
   </p:cSld>
@@ -1889,6 +2678,187 @@
               <a:defRPr/>
             </a:pPr>
             <a:r>
+              <a:rPr lang="en-US" baseline="0" dirty="0" smtClean="0"/>
+              <a:t>You can learn how to program me with the official publicly-available documentation </a:t>
+            </a:r>
+            <a:r>
+              <a:rPr lang="en-US" sz="1200" b="0" i="0" kern="1200" dirty="0" smtClean="0">
+                <a:solidFill>
+                  <a:schemeClr val="tx1"/>
+                </a:solidFill>
+                <a:effectLst/>
+                <a:latin typeface="+mn-lt"/>
+                <a:ea typeface="+mn-ea"/>
+                <a:cs typeface="+mn-cs"/>
+              </a:rPr>
+              <a:t>&lt;pause</a:t>
+            </a:r>
+            <a:r>
+              <a:rPr lang="en-US" sz="1200" b="0" i="0" kern="1200" baseline="0" dirty="0" smtClean="0">
+                <a:solidFill>
+                  <a:schemeClr val="tx1"/>
+                </a:solidFill>
+                <a:effectLst/>
+                <a:latin typeface="+mn-lt"/>
+                <a:ea typeface="+mn-ea"/>
+                <a:cs typeface="+mn-cs"/>
+              </a:rPr>
+              <a:t> time=“150”/</a:t>
+            </a:r>
+            <a:r>
+              <a:rPr lang="en-US" sz="1200" b="0" i="0" kern="1200" dirty="0" smtClean="0">
+                <a:solidFill>
+                  <a:schemeClr val="tx1"/>
+                </a:solidFill>
+                <a:effectLst/>
+                <a:latin typeface="+mn-lt"/>
+                <a:ea typeface="+mn-ea"/>
+                <a:cs typeface="+mn-cs"/>
+              </a:rPr>
+              <a:t>&gt;</a:t>
+            </a:r>
+            <a:r>
+              <a:rPr lang="en-US" baseline="0" dirty="0" smtClean="0"/>
+              <a:t> or with the homemade T S I documentation. Programming with me is pretty fun and interesting. You can try it yourself, by visiting the T S I basement organization. </a:t>
+            </a:r>
+            <a:r>
+              <a:rPr lang="en-US" sz="1200" b="0" i="0" kern="1200" dirty="0" smtClean="0">
+                <a:solidFill>
+                  <a:schemeClr val="tx1"/>
+                </a:solidFill>
+                <a:effectLst/>
+                <a:latin typeface="+mn-lt"/>
+                <a:ea typeface="+mn-ea"/>
+                <a:cs typeface="+mn-cs"/>
+              </a:rPr>
+              <a:t>&lt;pause</a:t>
+            </a:r>
+            <a:r>
+              <a:rPr lang="en-US" sz="1200" b="0" i="0" kern="1200" baseline="0" dirty="0" smtClean="0">
+                <a:solidFill>
+                  <a:schemeClr val="tx1"/>
+                </a:solidFill>
+                <a:effectLst/>
+                <a:latin typeface="+mn-lt"/>
+                <a:ea typeface="+mn-ea"/>
+                <a:cs typeface="+mn-cs"/>
+              </a:rPr>
+              <a:t> time=“200”/</a:t>
+            </a:r>
+            <a:r>
+              <a:rPr lang="en-US" sz="1200" b="0" i="0" kern="1200" dirty="0" smtClean="0">
+                <a:solidFill>
+                  <a:schemeClr val="tx1"/>
+                </a:solidFill>
+                <a:effectLst/>
+                <a:latin typeface="+mn-lt"/>
+                <a:ea typeface="+mn-ea"/>
+                <a:cs typeface="+mn-cs"/>
+              </a:rPr>
+              <a:t>&gt;</a:t>
+            </a:r>
+            <a:endParaRPr lang="en-US" dirty="0"/>
+          </a:p>
+        </p:txBody>
+      </p:sp>
+      <p:sp>
+        <p:nvSpPr>
+          <p:cNvPr id="4" name="Slide Number Placeholder 3"/>
+          <p:cNvSpPr>
+            <a:spLocks noGrp="1"/>
+          </p:cNvSpPr>
+          <p:nvPr>
+            <p:ph type="sldNum" sz="quarter" idx="10"/>
+          </p:nvPr>
+        </p:nvSpPr>
+        <p:spPr/>
+        <p:txBody>
+          <a:bodyPr/>
+          <a:lstStyle/>
+          <a:p>
+            <a:fld id="{21499F96-0033-4B5B-9466-41860159B28C}" type="slidenum">
+              <a:rPr lang="en-US" smtClean="0"/>
+              <a:t>7</a:t>
+            </a:fld>
+            <a:endParaRPr lang="en-US"/>
+          </a:p>
+        </p:txBody>
+      </p:sp>
+    </p:spTree>
+    <p:extLst>
+      <p:ext uri="{BB962C8B-B14F-4D97-AF65-F5344CB8AC3E}">
+        <p14:creationId xmlns:p14="http://schemas.microsoft.com/office/powerpoint/2010/main" val="3720339307"/>
+      </p:ext>
+    </p:extLst>
+  </p:cSld>
+  <p:clrMapOvr>
+    <a:masterClrMapping/>
+  </p:clrMapOvr>
+</p:notes>
+</file>
+
+<file path=ppt/notesSlides/notesSlide8.xml><?xml version="1.0" encoding="utf-8"?>
+<p:notes xmlns:a="http://schemas.openxmlformats.org/drawingml/2006/main" xmlns:r="http://schemas.openxmlformats.org/officeDocument/2006/relationships" xmlns:p="http://schemas.openxmlformats.org/presentationml/2006/main">
+  <p:cSld>
+    <p:spTree>
+      <p:nvGrpSpPr>
+        <p:cNvPr id="1" name=""/>
+        <p:cNvGrpSpPr/>
+        <p:nvPr/>
+      </p:nvGrpSpPr>
+      <p:grpSpPr>
+        <a:xfrm>
+          <a:off x="0" y="0"/>
+          <a:ext cx="0" cy="0"/>
+          <a:chOff x="0" y="0"/>
+          <a:chExt cx="0" cy="0"/>
+        </a:xfrm>
+      </p:grpSpPr>
+      <p:sp>
+        <p:nvSpPr>
+          <p:cNvPr id="2" name="Slide Image Placeholder 1"/>
+          <p:cNvSpPr>
+            <a:spLocks noGrp="1" noRot="1" noChangeAspect="1"/>
+          </p:cNvSpPr>
+          <p:nvPr>
+            <p:ph type="sldImg"/>
+          </p:nvPr>
+        </p:nvSpPr>
+        <p:spPr/>
+      </p:sp>
+      <p:sp>
+        <p:nvSpPr>
+          <p:cNvPr id="3" name="Notes Placeholder 2"/>
+          <p:cNvSpPr>
+            <a:spLocks noGrp="1"/>
+          </p:cNvSpPr>
+          <p:nvPr>
+            <p:ph type="body" idx="1"/>
+          </p:nvPr>
+        </p:nvSpPr>
+        <p:spPr/>
+        <p:txBody>
+          <a:bodyPr/>
+          <a:lstStyle/>
+          <a:p>
+            <a:pPr marL="0" marR="0" lvl="0" indent="0" algn="l" defTabSz="914400" rtl="0" eaLnBrk="1" fontAlgn="auto" latinLnBrk="0" hangingPunct="1">
+              <a:lnSpc>
+                <a:spcPct val="100000"/>
+              </a:lnSpc>
+              <a:spcBef>
+                <a:spcPts val="0"/>
+              </a:spcBef>
+              <a:spcAft>
+                <a:spcPts val="0"/>
+              </a:spcAft>
+              <a:buClrTx/>
+              <a:buSzTx/>
+              <a:buFontTx/>
+              <a:buNone/>
+              <a:tabLst/>
+              <a:defRPr/>
+            </a:pPr>
+            <a:r>
               <a:rPr lang="en-US" dirty="0" smtClean="0"/>
               <a:t>Thank</a:t>
             </a:r>
@@ -1980,7 +2950,7 @@
           <a:p>
             <a:fld id="{21499F96-0033-4B5B-9466-41860159B28C}" type="slidenum">
               <a:rPr lang="en-US" smtClean="0"/>
-              <a:t>7</a:t>
+              <a:t>8</a:t>
             </a:fld>
             <a:endParaRPr lang="en-US"/>
           </a:p>
@@ -2130,7 +3100,7 @@
           <a:p>
             <a:fld id="{CA170544-50CD-4A50-8C95-C77DB03F35E0}" type="datetimeFigureOut">
               <a:rPr lang="en-US" smtClean="0"/>
-              <a:t>7/12/2021</a:t>
+              <a:t>7/13/2021</a:t>
             </a:fld>
             <a:endParaRPr lang="en-US"/>
           </a:p>
@@ -2300,7 +3270,7 @@
           <a:p>
             <a:fld id="{CA170544-50CD-4A50-8C95-C77DB03F35E0}" type="datetimeFigureOut">
               <a:rPr lang="en-US" smtClean="0"/>
-              <a:t>7/12/2021</a:t>
+              <a:t>7/13/2021</a:t>
             </a:fld>
             <a:endParaRPr lang="en-US"/>
           </a:p>
@@ -2480,7 +3450,7 @@
           <a:p>
             <a:fld id="{CA170544-50CD-4A50-8C95-C77DB03F35E0}" type="datetimeFigureOut">
               <a:rPr lang="en-US" smtClean="0"/>
-              <a:t>7/12/2021</a:t>
+              <a:t>7/13/2021</a:t>
             </a:fld>
             <a:endParaRPr lang="en-US"/>
           </a:p>
@@ -2650,7 +3620,7 @@
           <a:p>
             <a:fld id="{CA170544-50CD-4A50-8C95-C77DB03F35E0}" type="datetimeFigureOut">
               <a:rPr lang="en-US" smtClean="0"/>
-              <a:t>7/12/2021</a:t>
+              <a:t>7/13/2021</a:t>
             </a:fld>
             <a:endParaRPr lang="en-US"/>
           </a:p>
@@ -2896,7 +3866,7 @@
           <a:p>
             <a:fld id="{CA170544-50CD-4A50-8C95-C77DB03F35E0}" type="datetimeFigureOut">
               <a:rPr lang="en-US" smtClean="0"/>
-              <a:t>7/12/2021</a:t>
+              <a:t>7/13/2021</a:t>
             </a:fld>
             <a:endParaRPr lang="en-US"/>
           </a:p>
@@ -3128,7 +4098,7 @@
           <a:p>
             <a:fld id="{CA170544-50CD-4A50-8C95-C77DB03F35E0}" type="datetimeFigureOut">
               <a:rPr lang="en-US" smtClean="0"/>
-              <a:t>7/12/2021</a:t>
+              <a:t>7/13/2021</a:t>
             </a:fld>
             <a:endParaRPr lang="en-US"/>
           </a:p>
@@ -3495,7 +4465,7 @@
           <a:p>
             <a:fld id="{CA170544-50CD-4A50-8C95-C77DB03F35E0}" type="datetimeFigureOut">
               <a:rPr lang="en-US" smtClean="0"/>
-              <a:t>7/12/2021</a:t>
+              <a:t>7/13/2021</a:t>
             </a:fld>
             <a:endParaRPr lang="en-US"/>
           </a:p>
@@ -3613,7 +4583,7 @@
           <a:p>
             <a:fld id="{CA170544-50CD-4A50-8C95-C77DB03F35E0}" type="datetimeFigureOut">
               <a:rPr lang="en-US" smtClean="0"/>
-              <a:t>7/12/2021</a:t>
+              <a:t>7/13/2021</a:t>
             </a:fld>
             <a:endParaRPr lang="en-US"/>
           </a:p>
@@ -3708,7 +4678,7 @@
           <a:p>
             <a:fld id="{CA170544-50CD-4A50-8C95-C77DB03F35E0}" type="datetimeFigureOut">
               <a:rPr lang="en-US" smtClean="0"/>
-              <a:t>7/12/2021</a:t>
+              <a:t>7/13/2021</a:t>
             </a:fld>
             <a:endParaRPr lang="en-US"/>
           </a:p>
@@ -3985,7 +4955,7 @@
           <a:p>
             <a:fld id="{CA170544-50CD-4A50-8C95-C77DB03F35E0}" type="datetimeFigureOut">
               <a:rPr lang="en-US" smtClean="0"/>
-              <a:t>7/12/2021</a:t>
+              <a:t>7/13/2021</a:t>
             </a:fld>
             <a:endParaRPr lang="en-US"/>
           </a:p>
@@ -4238,7 +5208,7 @@
           <a:p>
             <a:fld id="{CA170544-50CD-4A50-8C95-C77DB03F35E0}" type="datetimeFigureOut">
               <a:rPr lang="en-US" smtClean="0"/>
-              <a:t>7/12/2021</a:t>
+              <a:t>7/13/2021</a:t>
             </a:fld>
             <a:endParaRPr lang="en-US"/>
           </a:p>
@@ -4451,7 +5421,7 @@
           <a:p>
             <a:fld id="{CA170544-50CD-4A50-8C95-C77DB03F35E0}" type="datetimeFigureOut">
               <a:rPr lang="en-US" smtClean="0"/>
-              <a:t>7/12/2021</a:t>
+              <a:t>7/13/2021</a:t>
             </a:fld>
             <a:endParaRPr lang="en-US"/>
           </a:p>
@@ -4863,6 +5833,289 @@
             <a:spLocks noGrp="1"/>
           </p:cNvSpPr>
           <p:nvPr>
+            <p:ph type="title"/>
+          </p:nvPr>
+        </p:nvSpPr>
+        <p:spPr/>
+        <p:txBody>
+          <a:bodyPr/>
+          <a:lstStyle/>
+          <a:p>
+            <a:r>
+              <a:rPr lang="en-US" dirty="0" smtClean="0"/>
+              <a:t>TEST</a:t>
+            </a:r>
+            <a:endParaRPr lang="ru-RU" dirty="0"/>
+          </a:p>
+        </p:txBody>
+      </p:sp>
+      <p:sp>
+        <p:nvSpPr>
+          <p:cNvPr id="3" name="Content Placeholder 2"/>
+          <p:cNvSpPr>
+            <a:spLocks noGrp="1"/>
+          </p:cNvSpPr>
+          <p:nvPr>
+            <p:ph idx="1"/>
+          </p:nvPr>
+        </p:nvSpPr>
+        <p:spPr/>
+        <p:txBody>
+          <a:bodyPr/>
+          <a:lstStyle/>
+          <a:p>
+            <a:r>
+              <a:rPr lang="en-US" dirty="0" smtClean="0"/>
+              <a:t>Anima 1</a:t>
+            </a:r>
+            <a:endParaRPr lang="ru-RU" dirty="0"/>
+          </a:p>
+        </p:txBody>
+      </p:sp>
+      <p:sp>
+        <p:nvSpPr>
+          <p:cNvPr id="4" name="TextBox 3"/>
+          <p:cNvSpPr txBox="1"/>
+          <p:nvPr/>
+        </p:nvSpPr>
+        <p:spPr>
+          <a:xfrm>
+            <a:off x="925689" y="3115734"/>
+            <a:ext cx="3905956" cy="369332"/>
+          </a:xfrm>
+          <a:prstGeom prst="rect">
+            <a:avLst/>
+          </a:prstGeom>
+          <a:noFill/>
+        </p:spPr>
+        <p:txBody>
+          <a:bodyPr wrap="square" rtlCol="0">
+            <a:spAutoFit/>
+          </a:bodyPr>
+          <a:lstStyle/>
+          <a:p>
+            <a:r>
+              <a:rPr lang="en-US" dirty="0" smtClean="0"/>
+              <a:t>Amime2</a:t>
+            </a:r>
+            <a:endParaRPr lang="ru-RU" dirty="0"/>
+          </a:p>
+        </p:txBody>
+      </p:sp>
+    </p:spTree>
+    <p:extLst>
+      <p:ext uri="{BB962C8B-B14F-4D97-AF65-F5344CB8AC3E}">
+        <p14:creationId xmlns:p14="http://schemas.microsoft.com/office/powerpoint/2010/main" val="4186071885"/>
+      </p:ext>
+    </p:extLst>
+  </p:cSld>
+  <p:clrMapOvr>
+    <a:masterClrMapping/>
+  </p:clrMapOvr>
+  <p:transition spd="slow">
+    <p:wipe/>
+  </p:transition>
+  <p:timing>
+    <p:tnLst>
+      <p:par>
+        <p:cTn id="1" dur="indefinite" restart="never" nodeType="tmRoot">
+          <p:childTnLst>
+            <p:seq concurrent="1" nextAc="seek">
+              <p:cTn id="2" dur="indefinite" nodeType="mainSeq">
+                <p:childTnLst>
+                  <p:par>
+                    <p:cTn id="3" fill="hold">
+                      <p:stCondLst>
+                        <p:cond delay="indefinite"/>
+                      </p:stCondLst>
+                      <p:childTnLst>
+                        <p:par>
+                          <p:cTn id="4" fill="hold">
+                            <p:stCondLst>
+                              <p:cond delay="0"/>
+                            </p:stCondLst>
+                            <p:childTnLst>
+                              <p:par>
+                                <p:cTn id="5" presetID="1" presetClass="entr" presetSubtype="0" fill="hold" grpId="0" nodeType="clickEffect">
+                                  <p:stCondLst>
+                                    <p:cond delay="0"/>
+                                  </p:stCondLst>
+                                  <p:childTnLst>
+                                    <p:set>
+                                      <p:cBhvr>
+                                        <p:cTn id="6" dur="1" fill="hold">
+                                          <p:stCondLst>
+                                            <p:cond delay="0"/>
+                                          </p:stCondLst>
+                                        </p:cTn>
+                                        <p:tgtEl>
+                                          <p:spTgt spid="3">
+                                            <p:txEl>
+                                              <p:pRg st="0" end="0"/>
+                                            </p:txEl>
+                                          </p:spTgt>
+                                        </p:tgtEl>
+                                        <p:attrNameLst>
+                                          <p:attrName>style.visibility</p:attrName>
+                                        </p:attrNameLst>
+                                      </p:cBhvr>
+                                      <p:to>
+                                        <p:strVal val="visible"/>
+                                      </p:to>
+                                    </p:set>
+                                  </p:childTnLst>
+                                </p:cTn>
+                              </p:par>
+                            </p:childTnLst>
+                          </p:cTn>
+                        </p:par>
+                      </p:childTnLst>
+                    </p:cTn>
+                  </p:par>
+                  <p:par>
+                    <p:cTn id="7" fill="hold">
+                      <p:stCondLst>
+                        <p:cond delay="indefinite"/>
+                      </p:stCondLst>
+                      <p:childTnLst>
+                        <p:par>
+                          <p:cTn id="8" fill="hold">
+                            <p:stCondLst>
+                              <p:cond delay="0"/>
+                            </p:stCondLst>
+                            <p:childTnLst>
+                              <p:par>
+                                <p:cTn id="9" presetID="2" presetClass="entr" presetSubtype="4" fill="hold" grpId="0" nodeType="clickEffect">
+                                  <p:stCondLst>
+                                    <p:cond delay="0"/>
+                                  </p:stCondLst>
+                                  <p:childTnLst>
+                                    <p:set>
+                                      <p:cBhvr>
+                                        <p:cTn id="10" dur="1" fill="hold">
+                                          <p:stCondLst>
+                                            <p:cond delay="0"/>
+                                          </p:stCondLst>
+                                        </p:cTn>
+                                        <p:tgtEl>
+                                          <p:spTgt spid="4"/>
+                                        </p:tgtEl>
+                                        <p:attrNameLst>
+                                          <p:attrName>style.visibility</p:attrName>
+                                        </p:attrNameLst>
+                                      </p:cBhvr>
+                                      <p:to>
+                                        <p:strVal val="visible"/>
+                                      </p:to>
+                                    </p:set>
+                                    <p:anim calcmode="lin" valueType="num">
+                                      <p:cBhvr additive="base">
+                                        <p:cTn id="11" dur="500" fill="hold"/>
+                                        <p:tgtEl>
+                                          <p:spTgt spid="4"/>
+                                        </p:tgtEl>
+                                        <p:attrNameLst>
+                                          <p:attrName>ppt_x</p:attrName>
+                                        </p:attrNameLst>
+                                      </p:cBhvr>
+                                      <p:tavLst>
+                                        <p:tav tm="0">
+                                          <p:val>
+                                            <p:strVal val="#ppt_x"/>
+                                          </p:val>
+                                        </p:tav>
+                                        <p:tav tm="100000">
+                                          <p:val>
+                                            <p:strVal val="#ppt_x"/>
+                                          </p:val>
+                                        </p:tav>
+                                      </p:tavLst>
+                                    </p:anim>
+                                    <p:anim calcmode="lin" valueType="num">
+                                      <p:cBhvr additive="base">
+                                        <p:cTn id="12" dur="500" fill="hold"/>
+                                        <p:tgtEl>
+                                          <p:spTgt spid="4"/>
+                                        </p:tgtEl>
+                                        <p:attrNameLst>
+                                          <p:attrName>ppt_y</p:attrName>
+                                        </p:attrNameLst>
+                                      </p:cBhvr>
+                                      <p:tavLst>
+                                        <p:tav tm="0">
+                                          <p:val>
+                                            <p:strVal val="1+#ppt_h/2"/>
+                                          </p:val>
+                                        </p:tav>
+                                        <p:tav tm="100000">
+                                          <p:val>
+                                            <p:strVal val="#ppt_y"/>
+                                          </p:val>
+                                        </p:tav>
+                                      </p:tavLst>
+                                    </p:anim>
+                                  </p:childTnLst>
+                                </p:cTn>
+                              </p:par>
+                            </p:childTnLst>
+                          </p:cTn>
+                        </p:par>
+                      </p:childTnLst>
+                    </p:cTn>
+                  </p:par>
+                </p:childTnLst>
+              </p:cTn>
+              <p:prevCondLst>
+                <p:cond evt="onPrev" delay="0">
+                  <p:tgtEl>
+                    <p:sldTgt/>
+                  </p:tgtEl>
+                </p:cond>
+              </p:prevCondLst>
+              <p:nextCondLst>
+                <p:cond evt="onNext" delay="0">
+                  <p:tgtEl>
+                    <p:sldTgt/>
+                  </p:tgtEl>
+                </p:cond>
+              </p:nextCondLst>
+            </p:seq>
+          </p:childTnLst>
+        </p:cTn>
+      </p:par>
+    </p:tnLst>
+    <p:bldLst>
+      <p:bldP spid="3" grpId="0" build="p"/>
+      <p:bldP spid="4" grpId="0"/>
+    </p:bldLst>
+  </p:timing>
+</p:sld>
+</file>
+
+<file path=ppt/slides/slide2.xml><?xml version="1.0" encoding="utf-8"?>
+<p:sld xmlns:a="http://schemas.openxmlformats.org/drawingml/2006/main" xmlns:r="http://schemas.openxmlformats.org/officeDocument/2006/relationships" xmlns:p="http://schemas.openxmlformats.org/presentationml/2006/main">
+  <p:cSld>
+    <p:spTree>
+      <p:nvGrpSpPr>
+        <p:cNvPr id="1" name=""/>
+        <p:cNvGrpSpPr/>
+        <p:nvPr/>
+      </p:nvGrpSpPr>
+      <p:grpSpPr>
+        <a:xfrm>
+          <a:off x="0" y="0"/>
+          <a:ext cx="0" cy="0"/>
+          <a:chOff x="0" y="0"/>
+          <a:chExt cx="0" cy="0"/>
+        </a:xfrm>
+      </p:grpSpPr>
+      <p:sp>
+        <p:nvSpPr>
+          <p:cNvPr id="2" name="Title 1"/>
+          <p:cNvSpPr>
+            <a:spLocks noGrp="1"/>
+          </p:cNvSpPr>
+          <p:nvPr>
             <p:ph type="ctrTitle"/>
           </p:nvPr>
         </p:nvSpPr>
@@ -5147,7 +6400,7 @@
 </p:sld>
 </file>
 
-<file path=ppt/slides/slide2.xml><?xml version="1.0" encoding="utf-8"?>
+<file path=ppt/slides/slide3.xml><?xml version="1.0" encoding="utf-8"?>
 <p:sld xmlns:a="http://schemas.openxmlformats.org/drawingml/2006/main" xmlns:r="http://schemas.openxmlformats.org/officeDocument/2006/relationships" xmlns:p="http://schemas.openxmlformats.org/presentationml/2006/main">
   <p:cSld>
     <p:spTree>
@@ -5290,7 +6543,7 @@
 </p:sld>
 </file>
 
-<file path=ppt/slides/slide3.xml><?xml version="1.0" encoding="utf-8"?>
+<file path=ppt/slides/slide4.xml><?xml version="1.0" encoding="utf-8"?>
 <p:sld xmlns:a="http://schemas.openxmlformats.org/drawingml/2006/main" xmlns:r="http://schemas.openxmlformats.org/officeDocument/2006/relationships" xmlns:p="http://schemas.openxmlformats.org/presentationml/2006/main">
   <p:cSld>
     <p:spTree>
@@ -5390,7 +6643,7 @@
 </p:sld>
 </file>
 
-<file path=ppt/slides/slide4.xml><?xml version="1.0" encoding="utf-8"?>
+<file path=ppt/slides/slide5.xml><?xml version="1.0" encoding="utf-8"?>
 <p:sld xmlns:a="http://schemas.openxmlformats.org/drawingml/2006/main" xmlns:r="http://schemas.openxmlformats.org/officeDocument/2006/relationships" xmlns:p="http://schemas.openxmlformats.org/presentationml/2006/main">
   <p:cSld>
     <p:spTree>
@@ -5466,7 +6719,7 @@
 </p:sld>
 </file>
 
-<file path=ppt/slides/slide5.xml><?xml version="1.0" encoding="utf-8"?>
+<file path=ppt/slides/slide6.xml><?xml version="1.0" encoding="utf-8"?>
 <p:sld xmlns:a="http://schemas.openxmlformats.org/drawingml/2006/main" xmlns:r="http://schemas.openxmlformats.org/officeDocument/2006/relationships" xmlns:p="http://schemas.openxmlformats.org/presentationml/2006/main">
   <p:cSld>
     <p:spTree>
@@ -5607,7 +6860,7 @@
 </p:sld>
 </file>
 
-<file path=ppt/slides/slide6.xml><?xml version="1.0" encoding="utf-8"?>
+<file path=ppt/slides/slide7.xml><?xml version="1.0" encoding="utf-8"?>
 <p:sld xmlns:a="http://schemas.openxmlformats.org/drawingml/2006/main" xmlns:r="http://schemas.openxmlformats.org/officeDocument/2006/relationships" xmlns:p="http://schemas.openxmlformats.org/presentationml/2006/main">
   <p:cSld>
     <p:spTree>
@@ -5692,7 +6945,7 @@
 </p:sld>
 </file>
 
-<file path=ppt/slides/slide7.xml><?xml version="1.0" encoding="utf-8"?>
+<file path=ppt/slides/slide8.xml><?xml version="1.0" encoding="utf-8"?>
 <p:sld xmlns:a="http://schemas.openxmlformats.org/drawingml/2006/main" xmlns:r="http://schemas.openxmlformats.org/officeDocument/2006/relationships" xmlns:p="http://schemas.openxmlformats.org/presentationml/2006/main">
   <p:cSld>
     <p:spTree>

</xml_diff>